<commit_message>
release chapter professional survey mining
</commit_message>
<xml_diff>
--- a/_book/plot/pro-survey-job-piechart-1.pptx
+++ b/_book/plot/pro-survey-job-piechart-1.pptx
@@ -3158,140 +3158,137 @@
           <p:spPr>
             <a:xfrm>
               <a:off x="4882580" y="1973107"/>
-              <a:ext cx="855783" cy="1808317"/>
+              <a:ext cx="805251" cy="1808317"/>
             </a:xfrm>
             <a:custGeom>
               <a:avLst/>
               <a:pathLst>
-                <a:path w="855783" h="1808317">
+                <a:path w="805251" h="1808317">
                   <a:moveTo>
                     <a:pt x="0" y="1808317"/>
                   </a:moveTo>
                   <a:lnTo>
-                    <a:pt x="29509" y="1753386"/>
-                  </a:lnTo>
-                  <a:lnTo>
-                    <a:pt x="59019" y="1698455"/>
-                  </a:lnTo>
-                  <a:lnTo>
-                    <a:pt x="88529" y="1643524"/>
-                  </a:lnTo>
-                  <a:lnTo>
-                    <a:pt x="118039" y="1588593"/>
-                  </a:lnTo>
-                  <a:lnTo>
-                    <a:pt x="147548" y="1533662"/>
-                  </a:lnTo>
-                  <a:lnTo>
-                    <a:pt x="177058" y="1478731"/>
-                  </a:lnTo>
-                  <a:lnTo>
-                    <a:pt x="206568" y="1423800"/>
-                  </a:lnTo>
-                  <a:lnTo>
-                    <a:pt x="236078" y="1368869"/>
-                  </a:lnTo>
-                  <a:lnTo>
-                    <a:pt x="265587" y="1313938"/>
-                  </a:lnTo>
-                  <a:lnTo>
-                    <a:pt x="295097" y="1259007"/>
-                  </a:lnTo>
-                  <a:lnTo>
-                    <a:pt x="324607" y="1204076"/>
-                  </a:lnTo>
-                  <a:lnTo>
-                    <a:pt x="354117" y="1149145"/>
-                  </a:lnTo>
-                  <a:lnTo>
-                    <a:pt x="383627" y="1094214"/>
-                  </a:lnTo>
-                  <a:lnTo>
-                    <a:pt x="413136" y="1039283"/>
-                  </a:lnTo>
-                  <a:lnTo>
-                    <a:pt x="442646" y="984352"/>
-                  </a:lnTo>
-                  <a:lnTo>
-                    <a:pt x="472156" y="929421"/>
-                  </a:lnTo>
-                  <a:lnTo>
-                    <a:pt x="501666" y="874490"/>
-                  </a:lnTo>
-                  <a:lnTo>
-                    <a:pt x="531175" y="819559"/>
-                  </a:lnTo>
-                  <a:lnTo>
-                    <a:pt x="560685" y="764628"/>
-                  </a:lnTo>
-                  <a:lnTo>
-                    <a:pt x="590195" y="709697"/>
-                  </a:lnTo>
-                  <a:lnTo>
-                    <a:pt x="619705" y="654766"/>
-                  </a:lnTo>
-                  <a:lnTo>
-                    <a:pt x="649214" y="599835"/>
-                  </a:lnTo>
-                  <a:lnTo>
-                    <a:pt x="678724" y="544904"/>
-                  </a:lnTo>
-                  <a:lnTo>
-                    <a:pt x="708234" y="489973"/>
-                  </a:lnTo>
-                  <a:lnTo>
-                    <a:pt x="737744" y="435042"/>
-                  </a:lnTo>
-                  <a:lnTo>
-                    <a:pt x="767254" y="380111"/>
-                  </a:lnTo>
-                  <a:lnTo>
-                    <a:pt x="796763" y="325180"/>
-                  </a:lnTo>
-                  <a:lnTo>
-                    <a:pt x="826273" y="270249"/>
-                  </a:lnTo>
-                  <a:lnTo>
-                    <a:pt x="855783" y="215318"/>
-                  </a:lnTo>
-                  <a:lnTo>
-                    <a:pt x="799170" y="186177"/>
-                  </a:lnTo>
-                  <a:lnTo>
-                    <a:pt x="741567" y="159048"/>
-                  </a:lnTo>
-                  <a:lnTo>
-                    <a:pt x="683045" y="133963"/>
-                  </a:lnTo>
-                  <a:lnTo>
-                    <a:pt x="623675" y="110954"/>
-                  </a:lnTo>
-                  <a:lnTo>
-                    <a:pt x="563533" y="90050"/>
-                  </a:lnTo>
-                  <a:lnTo>
-                    <a:pt x="502692" y="71276"/>
-                  </a:lnTo>
-                  <a:lnTo>
-                    <a:pt x="441227" y="54655"/>
-                  </a:lnTo>
-                  <a:lnTo>
-                    <a:pt x="379216" y="40209"/>
-                  </a:lnTo>
-                  <a:lnTo>
-                    <a:pt x="316734" y="27954"/>
-                  </a:lnTo>
-                  <a:lnTo>
-                    <a:pt x="253859" y="17907"/>
-                  </a:lnTo>
-                  <a:lnTo>
-                    <a:pt x="190670" y="10080"/>
-                  </a:lnTo>
-                  <a:lnTo>
-                    <a:pt x="127245" y="4482"/>
-                  </a:lnTo>
-                  <a:lnTo>
-                    <a:pt x="63662" y="1120"/>
+                    <a:pt x="27767" y="1752485"/>
+                  </a:lnTo>
+                  <a:lnTo>
+                    <a:pt x="55534" y="1696653"/>
+                  </a:lnTo>
+                  <a:lnTo>
+                    <a:pt x="83301" y="1640821"/>
+                  </a:lnTo>
+                  <a:lnTo>
+                    <a:pt x="111069" y="1584989"/>
+                  </a:lnTo>
+                  <a:lnTo>
+                    <a:pt x="138836" y="1529157"/>
+                  </a:lnTo>
+                  <a:lnTo>
+                    <a:pt x="166603" y="1473325"/>
+                  </a:lnTo>
+                  <a:lnTo>
+                    <a:pt x="194371" y="1417492"/>
+                  </a:lnTo>
+                  <a:lnTo>
+                    <a:pt x="222138" y="1361660"/>
+                  </a:lnTo>
+                  <a:lnTo>
+                    <a:pt x="249905" y="1305828"/>
+                  </a:lnTo>
+                  <a:lnTo>
+                    <a:pt x="277672" y="1249996"/>
+                  </a:lnTo>
+                  <a:lnTo>
+                    <a:pt x="305440" y="1194164"/>
+                  </a:lnTo>
+                  <a:lnTo>
+                    <a:pt x="333207" y="1138332"/>
+                  </a:lnTo>
+                  <a:lnTo>
+                    <a:pt x="360974" y="1082500"/>
+                  </a:lnTo>
+                  <a:lnTo>
+                    <a:pt x="388742" y="1026668"/>
+                  </a:lnTo>
+                  <a:lnTo>
+                    <a:pt x="416509" y="970836"/>
+                  </a:lnTo>
+                  <a:lnTo>
+                    <a:pt x="444276" y="915004"/>
+                  </a:lnTo>
+                  <a:lnTo>
+                    <a:pt x="472044" y="859172"/>
+                  </a:lnTo>
+                  <a:lnTo>
+                    <a:pt x="499811" y="803340"/>
+                  </a:lnTo>
+                  <a:lnTo>
+                    <a:pt x="527578" y="747508"/>
+                  </a:lnTo>
+                  <a:lnTo>
+                    <a:pt x="555345" y="691676"/>
+                  </a:lnTo>
+                  <a:lnTo>
+                    <a:pt x="583113" y="635844"/>
+                  </a:lnTo>
+                  <a:lnTo>
+                    <a:pt x="610880" y="580011"/>
+                  </a:lnTo>
+                  <a:lnTo>
+                    <a:pt x="638647" y="524179"/>
+                  </a:lnTo>
+                  <a:lnTo>
+                    <a:pt x="666415" y="468347"/>
+                  </a:lnTo>
+                  <a:lnTo>
+                    <a:pt x="694182" y="412515"/>
+                  </a:lnTo>
+                  <a:lnTo>
+                    <a:pt x="721949" y="356683"/>
+                  </a:lnTo>
+                  <a:lnTo>
+                    <a:pt x="749717" y="300851"/>
+                  </a:lnTo>
+                  <a:lnTo>
+                    <a:pt x="777484" y="245019"/>
+                  </a:lnTo>
+                  <a:lnTo>
+                    <a:pt x="805251" y="189187"/>
+                  </a:lnTo>
+                  <a:lnTo>
+                    <a:pt x="747275" y="161626"/>
+                  </a:lnTo>
+                  <a:lnTo>
+                    <a:pt x="688357" y="136140"/>
+                  </a:lnTo>
+                  <a:lnTo>
+                    <a:pt x="628572" y="112761"/>
+                  </a:lnTo>
+                  <a:lnTo>
+                    <a:pt x="567994" y="91519"/>
+                  </a:lnTo>
+                  <a:lnTo>
+                    <a:pt x="506701" y="72441"/>
+                  </a:lnTo>
+                  <a:lnTo>
+                    <a:pt x="444769" y="55550"/>
+                  </a:lnTo>
+                  <a:lnTo>
+                    <a:pt x="382277" y="40868"/>
+                  </a:lnTo>
+                  <a:lnTo>
+                    <a:pt x="319303" y="28413"/>
+                  </a:lnTo>
+                  <a:lnTo>
+                    <a:pt x="255926" y="18201"/>
+                  </a:lnTo>
+                  <a:lnTo>
+                    <a:pt x="192227" y="10246"/>
+                  </a:lnTo>
+                  <a:lnTo>
+                    <a:pt x="128286" y="4556"/>
+                  </a:lnTo>
+                  <a:lnTo>
+                    <a:pt x="64183" y="1139"/>
                   </a:lnTo>
                   <a:lnTo>
                     <a:pt x="0" y="0"/>
@@ -3413,234 +3410,234 @@
           </p:nvSpPr>
           <p:spPr>
             <a:xfrm>
-              <a:off x="4882580" y="2188425"/>
-              <a:ext cx="1567397" cy="1592999"/>
+              <a:off x="4882580" y="2162295"/>
+              <a:ext cx="1548886" cy="1619129"/>
             </a:xfrm>
             <a:custGeom>
               <a:avLst/>
               <a:pathLst>
-                <a:path w="1567397" h="1592999">
+                <a:path w="1548886" h="1619129">
                   <a:moveTo>
-                    <a:pt x="0" y="1592999"/>
+                    <a:pt x="0" y="1619129"/>
                   </a:moveTo>
                   <a:lnTo>
-                    <a:pt x="54048" y="1561902"/>
-                  </a:lnTo>
-                  <a:lnTo>
-                    <a:pt x="108096" y="1530804"/>
-                  </a:lnTo>
-                  <a:lnTo>
-                    <a:pt x="162144" y="1499707"/>
-                  </a:lnTo>
-                  <a:lnTo>
-                    <a:pt x="216192" y="1468610"/>
-                  </a:lnTo>
-                  <a:lnTo>
-                    <a:pt x="270240" y="1437513"/>
-                  </a:lnTo>
-                  <a:lnTo>
-                    <a:pt x="324289" y="1406416"/>
-                  </a:lnTo>
-                  <a:lnTo>
-                    <a:pt x="378337" y="1375319"/>
-                  </a:lnTo>
-                  <a:lnTo>
-                    <a:pt x="432385" y="1344221"/>
-                  </a:lnTo>
-                  <a:lnTo>
-                    <a:pt x="486433" y="1313124"/>
-                  </a:lnTo>
-                  <a:lnTo>
-                    <a:pt x="540481" y="1282027"/>
-                  </a:lnTo>
-                  <a:lnTo>
-                    <a:pt x="594530" y="1250930"/>
-                  </a:lnTo>
-                  <a:lnTo>
-                    <a:pt x="648578" y="1219833"/>
-                  </a:lnTo>
-                  <a:lnTo>
-                    <a:pt x="702626" y="1188735"/>
-                  </a:lnTo>
-                  <a:lnTo>
-                    <a:pt x="756674" y="1157638"/>
-                  </a:lnTo>
-                  <a:lnTo>
-                    <a:pt x="810722" y="1126541"/>
-                  </a:lnTo>
-                  <a:lnTo>
-                    <a:pt x="864771" y="1095444"/>
-                  </a:lnTo>
-                  <a:lnTo>
-                    <a:pt x="918819" y="1064347"/>
-                  </a:lnTo>
-                  <a:lnTo>
-                    <a:pt x="972867" y="1033250"/>
-                  </a:lnTo>
-                  <a:lnTo>
-                    <a:pt x="1026915" y="1002152"/>
-                  </a:lnTo>
-                  <a:lnTo>
-                    <a:pt x="1080963" y="971055"/>
-                  </a:lnTo>
-                  <a:lnTo>
-                    <a:pt x="1135012" y="939958"/>
-                  </a:lnTo>
-                  <a:lnTo>
-                    <a:pt x="1189060" y="908861"/>
-                  </a:lnTo>
-                  <a:lnTo>
-                    <a:pt x="1243108" y="877764"/>
-                  </a:lnTo>
-                  <a:lnTo>
-                    <a:pt x="1297156" y="846666"/>
-                  </a:lnTo>
-                  <a:lnTo>
-                    <a:pt x="1351204" y="815569"/>
-                  </a:lnTo>
-                  <a:lnTo>
-                    <a:pt x="1405253" y="784472"/>
-                  </a:lnTo>
-                  <a:lnTo>
-                    <a:pt x="1459301" y="753375"/>
-                  </a:lnTo>
-                  <a:lnTo>
-                    <a:pt x="1513349" y="722278"/>
-                  </a:lnTo>
-                  <a:lnTo>
-                    <a:pt x="1567397" y="691181"/>
-                  </a:lnTo>
-                  <a:lnTo>
-                    <a:pt x="1535136" y="637296"/>
-                  </a:lnTo>
-                  <a:lnTo>
-                    <a:pt x="1501023" y="584564"/>
-                  </a:lnTo>
-                  <a:lnTo>
-                    <a:pt x="1465100" y="533049"/>
-                  </a:lnTo>
-                  <a:lnTo>
-                    <a:pt x="1427409" y="482812"/>
-                  </a:lnTo>
-                  <a:lnTo>
-                    <a:pt x="1387996" y="433915"/>
-                  </a:lnTo>
-                  <a:lnTo>
-                    <a:pt x="1346910" y="386415"/>
-                  </a:lnTo>
-                  <a:lnTo>
-                    <a:pt x="1304198" y="340371"/>
-                  </a:lnTo>
-                  <a:lnTo>
-                    <a:pt x="1259914" y="295838"/>
-                  </a:lnTo>
-                  <a:lnTo>
-                    <a:pt x="1214110" y="252869"/>
-                  </a:lnTo>
-                  <a:lnTo>
-                    <a:pt x="1166841" y="211517"/>
-                  </a:lnTo>
-                  <a:lnTo>
-                    <a:pt x="1118165" y="171831"/>
-                  </a:lnTo>
-                  <a:lnTo>
-                    <a:pt x="1068140" y="133859"/>
-                  </a:lnTo>
-                  <a:lnTo>
-                    <a:pt x="1016827" y="97648"/>
-                  </a:lnTo>
-                  <a:lnTo>
-                    <a:pt x="964287" y="63240"/>
-                  </a:lnTo>
-                  <a:lnTo>
-                    <a:pt x="910584" y="30678"/>
-                  </a:lnTo>
-                  <a:lnTo>
-                    <a:pt x="855783" y="0"/>
-                  </a:lnTo>
-                  <a:lnTo>
-                    <a:pt x="826273" y="54931"/>
-                  </a:lnTo>
-                  <a:lnTo>
-                    <a:pt x="796763" y="109862"/>
-                  </a:lnTo>
-                  <a:lnTo>
-                    <a:pt x="767254" y="164793"/>
-                  </a:lnTo>
-                  <a:lnTo>
-                    <a:pt x="737744" y="219724"/>
-                  </a:lnTo>
-                  <a:lnTo>
-                    <a:pt x="708234" y="274655"/>
-                  </a:lnTo>
-                  <a:lnTo>
-                    <a:pt x="678724" y="329586"/>
-                  </a:lnTo>
-                  <a:lnTo>
-                    <a:pt x="649214" y="384517"/>
-                  </a:lnTo>
-                  <a:lnTo>
-                    <a:pt x="619705" y="439448"/>
-                  </a:lnTo>
-                  <a:lnTo>
-                    <a:pt x="590195" y="494379"/>
-                  </a:lnTo>
-                  <a:lnTo>
-                    <a:pt x="560685" y="549310"/>
-                  </a:lnTo>
-                  <a:lnTo>
-                    <a:pt x="531175" y="604241"/>
-                  </a:lnTo>
-                  <a:lnTo>
-                    <a:pt x="501666" y="659172"/>
-                  </a:lnTo>
-                  <a:lnTo>
-                    <a:pt x="472156" y="714103"/>
-                  </a:lnTo>
-                  <a:lnTo>
-                    <a:pt x="442646" y="769034"/>
-                  </a:lnTo>
-                  <a:lnTo>
-                    <a:pt x="413136" y="823965"/>
-                  </a:lnTo>
-                  <a:lnTo>
-                    <a:pt x="383627" y="878896"/>
-                  </a:lnTo>
-                  <a:lnTo>
-                    <a:pt x="354117" y="933827"/>
-                  </a:lnTo>
-                  <a:lnTo>
-                    <a:pt x="324607" y="988758"/>
-                  </a:lnTo>
-                  <a:lnTo>
-                    <a:pt x="295097" y="1043689"/>
-                  </a:lnTo>
-                  <a:lnTo>
-                    <a:pt x="265587" y="1098620"/>
-                  </a:lnTo>
-                  <a:lnTo>
-                    <a:pt x="236078" y="1153551"/>
-                  </a:lnTo>
-                  <a:lnTo>
-                    <a:pt x="206568" y="1208482"/>
-                  </a:lnTo>
-                  <a:lnTo>
-                    <a:pt x="177058" y="1263413"/>
-                  </a:lnTo>
-                  <a:lnTo>
-                    <a:pt x="147548" y="1318344"/>
-                  </a:lnTo>
-                  <a:lnTo>
-                    <a:pt x="118039" y="1373275"/>
-                  </a:lnTo>
-                  <a:lnTo>
-                    <a:pt x="88529" y="1428206"/>
-                  </a:lnTo>
-                  <a:lnTo>
-                    <a:pt x="59019" y="1483137"/>
-                  </a:lnTo>
-                  <a:lnTo>
-                    <a:pt x="29509" y="1538068"/>
+                    <a:pt x="53409" y="1586948"/>
+                  </a:lnTo>
+                  <a:lnTo>
+                    <a:pt x="106819" y="1554767"/>
+                  </a:lnTo>
+                  <a:lnTo>
+                    <a:pt x="160229" y="1522586"/>
+                  </a:lnTo>
+                  <a:lnTo>
+                    <a:pt x="213639" y="1490405"/>
+                  </a:lnTo>
+                  <a:lnTo>
+                    <a:pt x="267049" y="1458224"/>
+                  </a:lnTo>
+                  <a:lnTo>
+                    <a:pt x="320459" y="1426043"/>
+                  </a:lnTo>
+                  <a:lnTo>
+                    <a:pt x="373869" y="1393861"/>
+                  </a:lnTo>
+                  <a:lnTo>
+                    <a:pt x="427279" y="1361680"/>
+                  </a:lnTo>
+                  <a:lnTo>
+                    <a:pt x="480688" y="1329499"/>
+                  </a:lnTo>
+                  <a:lnTo>
+                    <a:pt x="534098" y="1297318"/>
+                  </a:lnTo>
+                  <a:lnTo>
+                    <a:pt x="587508" y="1265137"/>
+                  </a:lnTo>
+                  <a:lnTo>
+                    <a:pt x="640918" y="1232956"/>
+                  </a:lnTo>
+                  <a:lnTo>
+                    <a:pt x="694328" y="1200774"/>
+                  </a:lnTo>
+                  <a:lnTo>
+                    <a:pt x="747738" y="1168593"/>
+                  </a:lnTo>
+                  <a:lnTo>
+                    <a:pt x="801148" y="1136412"/>
+                  </a:lnTo>
+                  <a:lnTo>
+                    <a:pt x="854558" y="1104231"/>
+                  </a:lnTo>
+                  <a:lnTo>
+                    <a:pt x="907968" y="1072050"/>
+                  </a:lnTo>
+                  <a:lnTo>
+                    <a:pt x="961377" y="1039869"/>
+                  </a:lnTo>
+                  <a:lnTo>
+                    <a:pt x="1014787" y="1007687"/>
+                  </a:lnTo>
+                  <a:lnTo>
+                    <a:pt x="1068197" y="975506"/>
+                  </a:lnTo>
+                  <a:lnTo>
+                    <a:pt x="1121607" y="943325"/>
+                  </a:lnTo>
+                  <a:lnTo>
+                    <a:pt x="1175017" y="911144"/>
+                  </a:lnTo>
+                  <a:lnTo>
+                    <a:pt x="1228427" y="878963"/>
+                  </a:lnTo>
+                  <a:lnTo>
+                    <a:pt x="1281837" y="846782"/>
+                  </a:lnTo>
+                  <a:lnTo>
+                    <a:pt x="1335247" y="814601"/>
+                  </a:lnTo>
+                  <a:lnTo>
+                    <a:pt x="1388656" y="782419"/>
+                  </a:lnTo>
+                  <a:lnTo>
+                    <a:pt x="1442066" y="750238"/>
+                  </a:lnTo>
+                  <a:lnTo>
+                    <a:pt x="1495476" y="718057"/>
+                  </a:lnTo>
+                  <a:lnTo>
+                    <a:pt x="1548886" y="685876"/>
+                  </a:lnTo>
+                  <a:lnTo>
+                    <a:pt x="1514848" y="631584"/>
+                  </a:lnTo>
+                  <a:lnTo>
+                    <a:pt x="1478908" y="578533"/>
+                  </a:lnTo>
+                  <a:lnTo>
+                    <a:pt x="1441111" y="526788"/>
+                  </a:lnTo>
+                  <a:lnTo>
+                    <a:pt x="1401504" y="476415"/>
+                  </a:lnTo>
+                  <a:lnTo>
+                    <a:pt x="1360138" y="427477"/>
+                  </a:lnTo>
+                  <a:lnTo>
+                    <a:pt x="1317063" y="380035"/>
+                  </a:lnTo>
+                  <a:lnTo>
+                    <a:pt x="1272335" y="334149"/>
+                  </a:lnTo>
+                  <a:lnTo>
+                    <a:pt x="1226009" y="289876"/>
+                  </a:lnTo>
+                  <a:lnTo>
+                    <a:pt x="1178143" y="247273"/>
+                  </a:lnTo>
+                  <a:lnTo>
+                    <a:pt x="1128798" y="206392"/>
+                  </a:lnTo>
+                  <a:lnTo>
+                    <a:pt x="1078036" y="167286"/>
+                  </a:lnTo>
+                  <a:lnTo>
+                    <a:pt x="1025920" y="130002"/>
+                  </a:lnTo>
+                  <a:lnTo>
+                    <a:pt x="972515" y="94589"/>
+                  </a:lnTo>
+                  <a:lnTo>
+                    <a:pt x="917890" y="61089"/>
+                  </a:lnTo>
+                  <a:lnTo>
+                    <a:pt x="862112" y="29546"/>
+                  </a:lnTo>
+                  <a:lnTo>
+                    <a:pt x="805251" y="0"/>
+                  </a:lnTo>
+                  <a:lnTo>
+                    <a:pt x="777484" y="55832"/>
+                  </a:lnTo>
+                  <a:lnTo>
+                    <a:pt x="749717" y="111664"/>
+                  </a:lnTo>
+                  <a:lnTo>
+                    <a:pt x="721949" y="167496"/>
+                  </a:lnTo>
+                  <a:lnTo>
+                    <a:pt x="694182" y="223328"/>
+                  </a:lnTo>
+                  <a:lnTo>
+                    <a:pt x="666415" y="279160"/>
+                  </a:lnTo>
+                  <a:lnTo>
+                    <a:pt x="638647" y="334992"/>
+                  </a:lnTo>
+                  <a:lnTo>
+                    <a:pt x="610880" y="390824"/>
+                  </a:lnTo>
+                  <a:lnTo>
+                    <a:pt x="583113" y="446656"/>
+                  </a:lnTo>
+                  <a:lnTo>
+                    <a:pt x="555345" y="502488"/>
+                  </a:lnTo>
+                  <a:lnTo>
+                    <a:pt x="527578" y="558320"/>
+                  </a:lnTo>
+                  <a:lnTo>
+                    <a:pt x="499811" y="614152"/>
+                  </a:lnTo>
+                  <a:lnTo>
+                    <a:pt x="472044" y="669984"/>
+                  </a:lnTo>
+                  <a:lnTo>
+                    <a:pt x="444276" y="725816"/>
+                  </a:lnTo>
+                  <a:lnTo>
+                    <a:pt x="416509" y="781648"/>
+                  </a:lnTo>
+                  <a:lnTo>
+                    <a:pt x="388742" y="837481"/>
+                  </a:lnTo>
+                  <a:lnTo>
+                    <a:pt x="360974" y="893313"/>
+                  </a:lnTo>
+                  <a:lnTo>
+                    <a:pt x="333207" y="949145"/>
+                  </a:lnTo>
+                  <a:lnTo>
+                    <a:pt x="305440" y="1004977"/>
+                  </a:lnTo>
+                  <a:lnTo>
+                    <a:pt x="277672" y="1060809"/>
+                  </a:lnTo>
+                  <a:lnTo>
+                    <a:pt x="249905" y="1116641"/>
+                  </a:lnTo>
+                  <a:lnTo>
+                    <a:pt x="222138" y="1172473"/>
+                  </a:lnTo>
+                  <a:lnTo>
+                    <a:pt x="194371" y="1228305"/>
+                  </a:lnTo>
+                  <a:lnTo>
+                    <a:pt x="166603" y="1284137"/>
+                  </a:lnTo>
+                  <a:lnTo>
+                    <a:pt x="138836" y="1339969"/>
+                  </a:lnTo>
+                  <a:lnTo>
+                    <a:pt x="111069" y="1395801"/>
+                  </a:lnTo>
+                  <a:lnTo>
+                    <a:pt x="83301" y="1451633"/>
+                  </a:lnTo>
+                  <a:lnTo>
+                    <a:pt x="55534" y="1507465"/>
+                  </a:lnTo>
+                  <a:lnTo>
+                    <a:pt x="27767" y="1563297"/>
                   </a:lnTo>
                   <a:close/>
                 </a:path>
@@ -3675,246 +3672,243 @@
           </p:nvSpPr>
           <p:spPr>
             <a:xfrm>
-              <a:off x="4882580" y="2879606"/>
-              <a:ext cx="1808299" cy="1204294"/>
+              <a:off x="4882580" y="2848171"/>
+              <a:ext cx="1808314" cy="1120693"/>
             </a:xfrm>
             <a:custGeom>
               <a:avLst/>
               <a:pathLst>
-                <a:path w="1808299" h="1204294">
+                <a:path w="1808314" h="1120693">
                   <a:moveTo>
-                    <a:pt x="0" y="901818"/>
+                    <a:pt x="0" y="933253"/>
                   </a:moveTo>
                   <a:lnTo>
-                    <a:pt x="61477" y="912248"/>
-                  </a:lnTo>
-                  <a:lnTo>
-                    <a:pt x="122954" y="922678"/>
-                  </a:lnTo>
-                  <a:lnTo>
-                    <a:pt x="184431" y="933108"/>
-                  </a:lnTo>
-                  <a:lnTo>
-                    <a:pt x="245909" y="943539"/>
-                  </a:lnTo>
-                  <a:lnTo>
-                    <a:pt x="307386" y="953969"/>
-                  </a:lnTo>
-                  <a:lnTo>
-                    <a:pt x="368863" y="964399"/>
-                  </a:lnTo>
-                  <a:lnTo>
-                    <a:pt x="430340" y="974829"/>
-                  </a:lnTo>
-                  <a:lnTo>
-                    <a:pt x="491818" y="985260"/>
-                  </a:lnTo>
-                  <a:lnTo>
-                    <a:pt x="553295" y="995690"/>
-                  </a:lnTo>
-                  <a:lnTo>
-                    <a:pt x="614772" y="1006120"/>
-                  </a:lnTo>
-                  <a:lnTo>
-                    <a:pt x="676249" y="1016550"/>
-                  </a:lnTo>
-                  <a:lnTo>
-                    <a:pt x="737727" y="1026980"/>
-                  </a:lnTo>
-                  <a:lnTo>
-                    <a:pt x="799204" y="1037411"/>
-                  </a:lnTo>
-                  <a:lnTo>
-                    <a:pt x="860681" y="1047841"/>
-                  </a:lnTo>
-                  <a:lnTo>
-                    <a:pt x="922158" y="1058271"/>
-                  </a:lnTo>
-                  <a:lnTo>
-                    <a:pt x="983636" y="1068701"/>
-                  </a:lnTo>
-                  <a:lnTo>
-                    <a:pt x="1045113" y="1079132"/>
-                  </a:lnTo>
-                  <a:lnTo>
-                    <a:pt x="1106590" y="1089562"/>
-                  </a:lnTo>
-                  <a:lnTo>
-                    <a:pt x="1168067" y="1099992"/>
-                  </a:lnTo>
-                  <a:lnTo>
-                    <a:pt x="1229545" y="1110422"/>
-                  </a:lnTo>
-                  <a:lnTo>
-                    <a:pt x="1291022" y="1120852"/>
-                  </a:lnTo>
-                  <a:lnTo>
-                    <a:pt x="1352499" y="1131283"/>
-                  </a:lnTo>
-                  <a:lnTo>
-                    <a:pt x="1413976" y="1141713"/>
-                  </a:lnTo>
-                  <a:lnTo>
-                    <a:pt x="1475454" y="1152143"/>
-                  </a:lnTo>
-                  <a:lnTo>
-                    <a:pt x="1536931" y="1162573"/>
-                  </a:lnTo>
-                  <a:lnTo>
-                    <a:pt x="1598408" y="1173003"/>
-                  </a:lnTo>
-                  <a:lnTo>
-                    <a:pt x="1659885" y="1183434"/>
-                  </a:lnTo>
-                  <a:lnTo>
-                    <a:pt x="1721363" y="1193864"/>
-                  </a:lnTo>
-                  <a:lnTo>
-                    <a:pt x="1782840" y="1204294"/>
-                  </a:lnTo>
-                  <a:lnTo>
-                    <a:pt x="1792214" y="1142604"/>
-                  </a:lnTo>
-                  <a:lnTo>
-                    <a:pt x="1799455" y="1080626"/>
-                  </a:lnTo>
-                  <a:lnTo>
-                    <a:pt x="1804553" y="1018436"/>
-                  </a:lnTo>
-                  <a:lnTo>
-                    <a:pt x="1807502" y="956107"/>
-                  </a:lnTo>
-                  <a:lnTo>
-                    <a:pt x="1808299" y="893714"/>
-                  </a:lnTo>
-                  <a:lnTo>
-                    <a:pt x="1806943" y="831330"/>
-                  </a:lnTo>
-                  <a:lnTo>
-                    <a:pt x="1803435" y="769030"/>
-                  </a:lnTo>
-                  <a:lnTo>
-                    <a:pt x="1797780" y="706888"/>
-                  </a:lnTo>
-                  <a:lnTo>
-                    <a:pt x="1789984" y="644978"/>
-                  </a:lnTo>
-                  <a:lnTo>
-                    <a:pt x="1780057" y="583374"/>
-                  </a:lnTo>
-                  <a:lnTo>
-                    <a:pt x="1768011" y="522149"/>
-                  </a:lnTo>
-                  <a:lnTo>
-                    <a:pt x="1753859" y="461376"/>
-                  </a:lnTo>
-                  <a:lnTo>
-                    <a:pt x="1737619" y="401128"/>
-                  </a:lnTo>
-                  <a:lnTo>
-                    <a:pt x="1719310" y="341476"/>
-                  </a:lnTo>
-                  <a:lnTo>
-                    <a:pt x="1698954" y="282491"/>
-                  </a:lnTo>
-                  <a:lnTo>
-                    <a:pt x="1676575" y="224243"/>
-                  </a:lnTo>
-                  <a:lnTo>
-                    <a:pt x="1652199" y="166802"/>
-                  </a:lnTo>
-                  <a:lnTo>
-                    <a:pt x="1625857" y="110237"/>
-                  </a:lnTo>
-                  <a:lnTo>
-                    <a:pt x="1597578" y="54614"/>
-                  </a:lnTo>
-                  <a:lnTo>
-                    <a:pt x="1567397" y="0"/>
-                  </a:lnTo>
-                  <a:lnTo>
-                    <a:pt x="1513349" y="31097"/>
-                  </a:lnTo>
-                  <a:lnTo>
-                    <a:pt x="1459301" y="62194"/>
-                  </a:lnTo>
-                  <a:lnTo>
-                    <a:pt x="1405253" y="93291"/>
-                  </a:lnTo>
-                  <a:lnTo>
-                    <a:pt x="1351204" y="124388"/>
-                  </a:lnTo>
-                  <a:lnTo>
-                    <a:pt x="1297156" y="155485"/>
-                  </a:lnTo>
-                  <a:lnTo>
-                    <a:pt x="1243108" y="186583"/>
-                  </a:lnTo>
-                  <a:lnTo>
-                    <a:pt x="1189060" y="217680"/>
-                  </a:lnTo>
-                  <a:lnTo>
-                    <a:pt x="1135012" y="248777"/>
-                  </a:lnTo>
-                  <a:lnTo>
-                    <a:pt x="1080963" y="279874"/>
-                  </a:lnTo>
-                  <a:lnTo>
-                    <a:pt x="1026915" y="310971"/>
-                  </a:lnTo>
-                  <a:lnTo>
-                    <a:pt x="972867" y="342068"/>
-                  </a:lnTo>
-                  <a:lnTo>
-                    <a:pt x="918819" y="373166"/>
-                  </a:lnTo>
-                  <a:lnTo>
-                    <a:pt x="864771" y="404263"/>
-                  </a:lnTo>
-                  <a:lnTo>
-                    <a:pt x="810722" y="435360"/>
-                  </a:lnTo>
-                  <a:lnTo>
-                    <a:pt x="756674" y="466457"/>
-                  </a:lnTo>
-                  <a:lnTo>
-                    <a:pt x="702626" y="497554"/>
-                  </a:lnTo>
-                  <a:lnTo>
-                    <a:pt x="648578" y="528652"/>
-                  </a:lnTo>
-                  <a:lnTo>
-                    <a:pt x="594530" y="559749"/>
-                  </a:lnTo>
-                  <a:lnTo>
-                    <a:pt x="540481" y="590846"/>
-                  </a:lnTo>
-                  <a:lnTo>
-                    <a:pt x="486433" y="621943"/>
-                  </a:lnTo>
-                  <a:lnTo>
-                    <a:pt x="432385" y="653040"/>
-                  </a:lnTo>
-                  <a:lnTo>
-                    <a:pt x="378337" y="684137"/>
-                  </a:lnTo>
-                  <a:lnTo>
-                    <a:pt x="324289" y="715235"/>
-                  </a:lnTo>
-                  <a:lnTo>
-                    <a:pt x="270240" y="746332"/>
-                  </a:lnTo>
-                  <a:lnTo>
-                    <a:pt x="216192" y="777429"/>
-                  </a:lnTo>
-                  <a:lnTo>
-                    <a:pt x="162144" y="808526"/>
-                  </a:lnTo>
-                  <a:lnTo>
-                    <a:pt x="108096" y="839623"/>
-                  </a:lnTo>
-                  <a:lnTo>
-                    <a:pt x="54048" y="870721"/>
+                    <a:pt x="62019" y="939717"/>
+                  </a:lnTo>
+                  <a:lnTo>
+                    <a:pt x="124039" y="946180"/>
+                  </a:lnTo>
+                  <a:lnTo>
+                    <a:pt x="186059" y="952643"/>
+                  </a:lnTo>
+                  <a:lnTo>
+                    <a:pt x="248079" y="959107"/>
+                  </a:lnTo>
+                  <a:lnTo>
+                    <a:pt x="310099" y="965570"/>
+                  </a:lnTo>
+                  <a:lnTo>
+                    <a:pt x="372119" y="972034"/>
+                  </a:lnTo>
+                  <a:lnTo>
+                    <a:pt x="434139" y="978497"/>
+                  </a:lnTo>
+                  <a:lnTo>
+                    <a:pt x="496159" y="984961"/>
+                  </a:lnTo>
+                  <a:lnTo>
+                    <a:pt x="558178" y="991424"/>
+                  </a:lnTo>
+                  <a:lnTo>
+                    <a:pt x="620198" y="997887"/>
+                  </a:lnTo>
+                  <a:lnTo>
+                    <a:pt x="682218" y="1004351"/>
+                  </a:lnTo>
+                  <a:lnTo>
+                    <a:pt x="744238" y="1010814"/>
+                  </a:lnTo>
+                  <a:lnTo>
+                    <a:pt x="806258" y="1017278"/>
+                  </a:lnTo>
+                  <a:lnTo>
+                    <a:pt x="868278" y="1023741"/>
+                  </a:lnTo>
+                  <a:lnTo>
+                    <a:pt x="930298" y="1030205"/>
+                  </a:lnTo>
+                  <a:lnTo>
+                    <a:pt x="992318" y="1036668"/>
+                  </a:lnTo>
+                  <a:lnTo>
+                    <a:pt x="1054338" y="1043131"/>
+                  </a:lnTo>
+                  <a:lnTo>
+                    <a:pt x="1116357" y="1049595"/>
+                  </a:lnTo>
+                  <a:lnTo>
+                    <a:pt x="1178377" y="1056058"/>
+                  </a:lnTo>
+                  <a:lnTo>
+                    <a:pt x="1240397" y="1062522"/>
+                  </a:lnTo>
+                  <a:lnTo>
+                    <a:pt x="1302417" y="1068985"/>
+                  </a:lnTo>
+                  <a:lnTo>
+                    <a:pt x="1364437" y="1075449"/>
+                  </a:lnTo>
+                  <a:lnTo>
+                    <a:pt x="1426457" y="1081912"/>
+                  </a:lnTo>
+                  <a:lnTo>
+                    <a:pt x="1488477" y="1088376"/>
+                  </a:lnTo>
+                  <a:lnTo>
+                    <a:pt x="1550497" y="1094839"/>
+                  </a:lnTo>
+                  <a:lnTo>
+                    <a:pt x="1612517" y="1101302"/>
+                  </a:lnTo>
+                  <a:lnTo>
+                    <a:pt x="1674536" y="1107766"/>
+                  </a:lnTo>
+                  <a:lnTo>
+                    <a:pt x="1736556" y="1114229"/>
+                  </a:lnTo>
+                  <a:lnTo>
+                    <a:pt x="1798576" y="1120693"/>
+                  </a:lnTo>
+                  <a:lnTo>
+                    <a:pt x="1803909" y="1059433"/>
+                  </a:lnTo>
+                  <a:lnTo>
+                    <a:pt x="1807156" y="998028"/>
+                  </a:lnTo>
+                  <a:lnTo>
+                    <a:pt x="1808314" y="936547"/>
+                  </a:lnTo>
+                  <a:lnTo>
+                    <a:pt x="1807380" y="875063"/>
+                  </a:lnTo>
+                  <a:lnTo>
+                    <a:pt x="1804357" y="813646"/>
+                  </a:lnTo>
+                  <a:lnTo>
+                    <a:pt x="1799247" y="752368"/>
+                  </a:lnTo>
+                  <a:lnTo>
+                    <a:pt x="1792057" y="691298"/>
+                  </a:lnTo>
+                  <a:lnTo>
+                    <a:pt x="1782794" y="630509"/>
+                  </a:lnTo>
+                  <a:lnTo>
+                    <a:pt x="1771470" y="570069"/>
+                  </a:lnTo>
+                  <a:lnTo>
+                    <a:pt x="1758098" y="510050"/>
+                  </a:lnTo>
+                  <a:lnTo>
+                    <a:pt x="1742693" y="450519"/>
+                  </a:lnTo>
+                  <a:lnTo>
+                    <a:pt x="1725273" y="391547"/>
+                  </a:lnTo>
+                  <a:lnTo>
+                    <a:pt x="1705857" y="333202"/>
+                  </a:lnTo>
+                  <a:lnTo>
+                    <a:pt x="1684469" y="275550"/>
+                  </a:lnTo>
+                  <a:lnTo>
+                    <a:pt x="1661134" y="218659"/>
+                  </a:lnTo>
+                  <a:lnTo>
+                    <a:pt x="1635877" y="162594"/>
+                  </a:lnTo>
+                  <a:lnTo>
+                    <a:pt x="1608729" y="107420"/>
+                  </a:lnTo>
+                  <a:lnTo>
+                    <a:pt x="1579721" y="53201"/>
+                  </a:lnTo>
+                  <a:lnTo>
+                    <a:pt x="1548886" y="0"/>
+                  </a:lnTo>
+                  <a:lnTo>
+                    <a:pt x="1495476" y="32181"/>
+                  </a:lnTo>
+                  <a:lnTo>
+                    <a:pt x="1442066" y="64362"/>
+                  </a:lnTo>
+                  <a:lnTo>
+                    <a:pt x="1388656" y="96543"/>
+                  </a:lnTo>
+                  <a:lnTo>
+                    <a:pt x="1335247" y="128724"/>
+                  </a:lnTo>
+                  <a:lnTo>
+                    <a:pt x="1281837" y="160905"/>
+                  </a:lnTo>
+                  <a:lnTo>
+                    <a:pt x="1228427" y="193086"/>
+                  </a:lnTo>
+                  <a:lnTo>
+                    <a:pt x="1175017" y="225268"/>
+                  </a:lnTo>
+                  <a:lnTo>
+                    <a:pt x="1121607" y="257449"/>
+                  </a:lnTo>
+                  <a:lnTo>
+                    <a:pt x="1068197" y="289630"/>
+                  </a:lnTo>
+                  <a:lnTo>
+                    <a:pt x="1014787" y="321811"/>
+                  </a:lnTo>
+                  <a:lnTo>
+                    <a:pt x="961377" y="353992"/>
+                  </a:lnTo>
+                  <a:lnTo>
+                    <a:pt x="907968" y="386173"/>
+                  </a:lnTo>
+                  <a:lnTo>
+                    <a:pt x="854558" y="418355"/>
+                  </a:lnTo>
+                  <a:lnTo>
+                    <a:pt x="801148" y="450536"/>
+                  </a:lnTo>
+                  <a:lnTo>
+                    <a:pt x="747738" y="482717"/>
+                  </a:lnTo>
+                  <a:lnTo>
+                    <a:pt x="694328" y="514898"/>
+                  </a:lnTo>
+                  <a:lnTo>
+                    <a:pt x="640918" y="547079"/>
+                  </a:lnTo>
+                  <a:lnTo>
+                    <a:pt x="587508" y="579260"/>
+                  </a:lnTo>
+                  <a:lnTo>
+                    <a:pt x="534098" y="611442"/>
+                  </a:lnTo>
+                  <a:lnTo>
+                    <a:pt x="480688" y="643623"/>
+                  </a:lnTo>
+                  <a:lnTo>
+                    <a:pt x="427279" y="675804"/>
+                  </a:lnTo>
+                  <a:lnTo>
+                    <a:pt x="373869" y="707985"/>
+                  </a:lnTo>
+                  <a:lnTo>
+                    <a:pt x="320459" y="740166"/>
+                  </a:lnTo>
+                  <a:lnTo>
+                    <a:pt x="267049" y="772347"/>
+                  </a:lnTo>
+                  <a:lnTo>
+                    <a:pt x="213639" y="804528"/>
+                  </a:lnTo>
+                  <a:lnTo>
+                    <a:pt x="160229" y="836710"/>
+                  </a:lnTo>
+                  <a:lnTo>
+                    <a:pt x="106819" y="868891"/>
+                  </a:lnTo>
+                  <a:lnTo>
+                    <a:pt x="53409" y="901072"/>
                   </a:lnTo>
                   <a:close/>
                 </a:path>
@@ -3949,300 +3943,336 @@
           </p:nvSpPr>
           <p:spPr>
             <a:xfrm>
-              <a:off x="4882580" y="3781425"/>
-              <a:ext cx="1782840" cy="1801765"/>
+              <a:off x="4451602" y="3781425"/>
+              <a:ext cx="2229554" cy="1808315"/>
             </a:xfrm>
             <a:custGeom>
               <a:avLst/>
               <a:pathLst>
-                <a:path w="1782840" h="1801765">
+                <a:path w="2229554" h="1808315">
                   <a:moveTo>
-                    <a:pt x="0" y="0"/>
+                    <a:pt x="430977" y="0"/>
                   </a:moveTo>
                   <a:lnTo>
-                    <a:pt x="5303" y="62129"/>
-                  </a:lnTo>
-                  <a:lnTo>
-                    <a:pt x="10606" y="124259"/>
-                  </a:lnTo>
-                  <a:lnTo>
-                    <a:pt x="15909" y="186389"/>
-                  </a:lnTo>
-                  <a:lnTo>
-                    <a:pt x="21212" y="248519"/>
-                  </a:lnTo>
-                  <a:lnTo>
-                    <a:pt x="26515" y="310649"/>
-                  </a:lnTo>
-                  <a:lnTo>
-                    <a:pt x="31819" y="372779"/>
-                  </a:lnTo>
-                  <a:lnTo>
-                    <a:pt x="37122" y="434908"/>
-                  </a:lnTo>
-                  <a:lnTo>
-                    <a:pt x="42425" y="497038"/>
-                  </a:lnTo>
-                  <a:lnTo>
-                    <a:pt x="47728" y="559168"/>
-                  </a:lnTo>
-                  <a:lnTo>
-                    <a:pt x="53031" y="621298"/>
-                  </a:lnTo>
-                  <a:lnTo>
-                    <a:pt x="58335" y="683428"/>
-                  </a:lnTo>
-                  <a:lnTo>
-                    <a:pt x="63638" y="745558"/>
-                  </a:lnTo>
-                  <a:lnTo>
-                    <a:pt x="68941" y="807688"/>
-                  </a:lnTo>
-                  <a:lnTo>
-                    <a:pt x="74244" y="869817"/>
-                  </a:lnTo>
-                  <a:lnTo>
-                    <a:pt x="79547" y="931947"/>
-                  </a:lnTo>
-                  <a:lnTo>
-                    <a:pt x="84851" y="994077"/>
-                  </a:lnTo>
-                  <a:lnTo>
-                    <a:pt x="90154" y="1056207"/>
-                  </a:lnTo>
-                  <a:lnTo>
-                    <a:pt x="95457" y="1118337"/>
-                  </a:lnTo>
-                  <a:lnTo>
-                    <a:pt x="100760" y="1180467"/>
-                  </a:lnTo>
-                  <a:lnTo>
-                    <a:pt x="106063" y="1242597"/>
-                  </a:lnTo>
-                  <a:lnTo>
-                    <a:pt x="111366" y="1304726"/>
-                  </a:lnTo>
-                  <a:lnTo>
-                    <a:pt x="116670" y="1366856"/>
-                  </a:lnTo>
-                  <a:lnTo>
-                    <a:pt x="121973" y="1428986"/>
-                  </a:lnTo>
-                  <a:lnTo>
-                    <a:pt x="127276" y="1491116"/>
-                  </a:lnTo>
-                  <a:lnTo>
-                    <a:pt x="132579" y="1553246"/>
-                  </a:lnTo>
-                  <a:lnTo>
-                    <a:pt x="137882" y="1615376"/>
-                  </a:lnTo>
-                  <a:lnTo>
-                    <a:pt x="143186" y="1677506"/>
-                  </a:lnTo>
-                  <a:lnTo>
-                    <a:pt x="148489" y="1739635"/>
-                  </a:lnTo>
-                  <a:lnTo>
-                    <a:pt x="153792" y="1801765"/>
-                  </a:lnTo>
-                  <a:lnTo>
-                    <a:pt x="216160" y="1795351"/>
-                  </a:lnTo>
-                  <a:lnTo>
-                    <a:pt x="278269" y="1786778"/>
-                  </a:lnTo>
-                  <a:lnTo>
-                    <a:pt x="340043" y="1776058"/>
-                  </a:lnTo>
-                  <a:lnTo>
-                    <a:pt x="401408" y="1763202"/>
-                  </a:lnTo>
-                  <a:lnTo>
-                    <a:pt x="462290" y="1748227"/>
-                  </a:lnTo>
-                  <a:lnTo>
-                    <a:pt x="522617" y="1731150"/>
-                  </a:lnTo>
-                  <a:lnTo>
-                    <a:pt x="582316" y="1711992"/>
-                  </a:lnTo>
-                  <a:lnTo>
-                    <a:pt x="641314" y="1690777"/>
-                  </a:lnTo>
-                  <a:lnTo>
-                    <a:pt x="699542" y="1667528"/>
-                  </a:lnTo>
-                  <a:lnTo>
-                    <a:pt x="756929" y="1642275"/>
-                  </a:lnTo>
-                  <a:lnTo>
-                    <a:pt x="813406" y="1615048"/>
-                  </a:lnTo>
-                  <a:lnTo>
-                    <a:pt x="868905" y="1585880"/>
-                  </a:lnTo>
-                  <a:lnTo>
-                    <a:pt x="923359" y="1554805"/>
-                  </a:lnTo>
-                  <a:lnTo>
-                    <a:pt x="976704" y="1521861"/>
-                  </a:lnTo>
-                  <a:lnTo>
-                    <a:pt x="1028874" y="1487087"/>
-                  </a:lnTo>
-                  <a:lnTo>
-                    <a:pt x="1079807" y="1450526"/>
-                  </a:lnTo>
-                  <a:lnTo>
-                    <a:pt x="1129443" y="1412221"/>
-                  </a:lnTo>
-                  <a:lnTo>
-                    <a:pt x="1177721" y="1372218"/>
-                  </a:lnTo>
-                  <a:lnTo>
-                    <a:pt x="1224583" y="1330566"/>
-                  </a:lnTo>
-                  <a:lnTo>
-                    <a:pt x="1269973" y="1287315"/>
-                  </a:lnTo>
-                  <a:lnTo>
-                    <a:pt x="1313836" y="1242516"/>
-                  </a:lnTo>
-                  <a:lnTo>
-                    <a:pt x="1356120" y="1196223"/>
-                  </a:lnTo>
-                  <a:lnTo>
-                    <a:pt x="1396773" y="1148492"/>
-                  </a:lnTo>
-                  <a:lnTo>
-                    <a:pt x="1435748" y="1099381"/>
-                  </a:lnTo>
-                  <a:lnTo>
-                    <a:pt x="1472996" y="1048948"/>
-                  </a:lnTo>
-                  <a:lnTo>
-                    <a:pt x="1508474" y="997254"/>
-                  </a:lnTo>
-                  <a:lnTo>
-                    <a:pt x="1542139" y="944361"/>
-                  </a:lnTo>
-                  <a:lnTo>
-                    <a:pt x="1573949" y="890333"/>
-                  </a:lnTo>
-                  <a:lnTo>
-                    <a:pt x="1603868" y="835235"/>
-                  </a:lnTo>
-                  <a:lnTo>
-                    <a:pt x="1631859" y="779132"/>
-                  </a:lnTo>
-                  <a:lnTo>
-                    <a:pt x="1657888" y="722093"/>
-                  </a:lnTo>
-                  <a:lnTo>
-                    <a:pt x="1681923" y="664186"/>
-                  </a:lnTo>
-                  <a:lnTo>
-                    <a:pt x="1703937" y="605481"/>
-                  </a:lnTo>
-                  <a:lnTo>
-                    <a:pt x="1723903" y="546047"/>
-                  </a:lnTo>
-                  <a:lnTo>
-                    <a:pt x="1741796" y="485958"/>
-                  </a:lnTo>
-                  <a:lnTo>
-                    <a:pt x="1757596" y="425284"/>
-                  </a:lnTo>
-                  <a:lnTo>
-                    <a:pt x="1771283" y="364099"/>
-                  </a:lnTo>
-                  <a:lnTo>
-                    <a:pt x="1782840" y="302476"/>
-                  </a:lnTo>
-                  <a:lnTo>
-                    <a:pt x="1721363" y="292046"/>
-                  </a:lnTo>
-                  <a:lnTo>
-                    <a:pt x="1659885" y="281615"/>
-                  </a:lnTo>
-                  <a:lnTo>
-                    <a:pt x="1598408" y="271185"/>
-                  </a:lnTo>
-                  <a:lnTo>
-                    <a:pt x="1536931" y="260755"/>
-                  </a:lnTo>
-                  <a:lnTo>
-                    <a:pt x="1475454" y="250325"/>
-                  </a:lnTo>
-                  <a:lnTo>
-                    <a:pt x="1413976" y="239895"/>
-                  </a:lnTo>
-                  <a:lnTo>
-                    <a:pt x="1352499" y="229464"/>
-                  </a:lnTo>
-                  <a:lnTo>
-                    <a:pt x="1291022" y="219034"/>
-                  </a:lnTo>
-                  <a:lnTo>
-                    <a:pt x="1229545" y="208604"/>
-                  </a:lnTo>
-                  <a:lnTo>
-                    <a:pt x="1168067" y="198174"/>
-                  </a:lnTo>
-                  <a:lnTo>
-                    <a:pt x="1106590" y="187743"/>
-                  </a:lnTo>
-                  <a:lnTo>
-                    <a:pt x="1045113" y="177313"/>
-                  </a:lnTo>
-                  <a:lnTo>
-                    <a:pt x="983636" y="166883"/>
-                  </a:lnTo>
-                  <a:lnTo>
-                    <a:pt x="922158" y="156453"/>
-                  </a:lnTo>
-                  <a:lnTo>
-                    <a:pt x="860681" y="146023"/>
-                  </a:lnTo>
-                  <a:lnTo>
-                    <a:pt x="799204" y="135592"/>
-                  </a:lnTo>
-                  <a:lnTo>
-                    <a:pt x="737727" y="125162"/>
-                  </a:lnTo>
-                  <a:lnTo>
-                    <a:pt x="676249" y="114732"/>
-                  </a:lnTo>
-                  <a:lnTo>
-                    <a:pt x="614772" y="104302"/>
-                  </a:lnTo>
-                  <a:lnTo>
-                    <a:pt x="553295" y="93871"/>
-                  </a:lnTo>
-                  <a:lnTo>
-                    <a:pt x="491818" y="83441"/>
-                  </a:lnTo>
-                  <a:lnTo>
-                    <a:pt x="430340" y="73011"/>
-                  </a:lnTo>
-                  <a:lnTo>
-                    <a:pt x="368863" y="62581"/>
-                  </a:lnTo>
-                  <a:lnTo>
-                    <a:pt x="307386" y="52151"/>
-                  </a:lnTo>
-                  <a:lnTo>
-                    <a:pt x="245909" y="41720"/>
-                  </a:lnTo>
-                  <a:lnTo>
-                    <a:pt x="184431" y="31290"/>
-                  </a:lnTo>
-                  <a:lnTo>
-                    <a:pt x="122954" y="20860"/>
-                  </a:lnTo>
-                  <a:lnTo>
-                    <a:pt x="61477" y="10430"/>
+                    <a:pt x="416116" y="60558"/>
+                  </a:lnTo>
+                  <a:lnTo>
+                    <a:pt x="401254" y="121117"/>
+                  </a:lnTo>
+                  <a:lnTo>
+                    <a:pt x="386393" y="181676"/>
+                  </a:lnTo>
+                  <a:lnTo>
+                    <a:pt x="371532" y="242235"/>
+                  </a:lnTo>
+                  <a:lnTo>
+                    <a:pt x="356671" y="302794"/>
+                  </a:lnTo>
+                  <a:lnTo>
+                    <a:pt x="341809" y="363353"/>
+                  </a:lnTo>
+                  <a:lnTo>
+                    <a:pt x="326948" y="423912"/>
+                  </a:lnTo>
+                  <a:lnTo>
+                    <a:pt x="312087" y="484471"/>
+                  </a:lnTo>
+                  <a:lnTo>
+                    <a:pt x="297225" y="545030"/>
+                  </a:lnTo>
+                  <a:lnTo>
+                    <a:pt x="282364" y="605589"/>
+                  </a:lnTo>
+                  <a:lnTo>
+                    <a:pt x="267503" y="666148"/>
+                  </a:lnTo>
+                  <a:lnTo>
+                    <a:pt x="252642" y="726707"/>
+                  </a:lnTo>
+                  <a:lnTo>
+                    <a:pt x="237780" y="787266"/>
+                  </a:lnTo>
+                  <a:lnTo>
+                    <a:pt x="222919" y="847825"/>
+                  </a:lnTo>
+                  <a:lnTo>
+                    <a:pt x="208058" y="908384"/>
+                  </a:lnTo>
+                  <a:lnTo>
+                    <a:pt x="193196" y="968942"/>
+                  </a:lnTo>
+                  <a:lnTo>
+                    <a:pt x="178335" y="1029501"/>
+                  </a:lnTo>
+                  <a:lnTo>
+                    <a:pt x="163474" y="1090060"/>
+                  </a:lnTo>
+                  <a:lnTo>
+                    <a:pt x="148612" y="1150619"/>
+                  </a:lnTo>
+                  <a:lnTo>
+                    <a:pt x="133751" y="1211178"/>
+                  </a:lnTo>
+                  <a:lnTo>
+                    <a:pt x="118890" y="1271737"/>
+                  </a:lnTo>
+                  <a:lnTo>
+                    <a:pt x="104029" y="1332296"/>
+                  </a:lnTo>
+                  <a:lnTo>
+                    <a:pt x="89167" y="1392855"/>
+                  </a:lnTo>
+                  <a:lnTo>
+                    <a:pt x="74306" y="1453414"/>
+                  </a:lnTo>
+                  <a:lnTo>
+                    <a:pt x="59445" y="1513973"/>
+                  </a:lnTo>
+                  <a:lnTo>
+                    <a:pt x="44583" y="1574532"/>
+                  </a:lnTo>
+                  <a:lnTo>
+                    <a:pt x="29722" y="1635091"/>
+                  </a:lnTo>
+                  <a:lnTo>
+                    <a:pt x="14861" y="1695650"/>
+                  </a:lnTo>
+                  <a:lnTo>
+                    <a:pt x="0" y="1756209"/>
+                  </a:lnTo>
+                  <a:lnTo>
+                    <a:pt x="60217" y="1769900"/>
+                  </a:lnTo>
+                  <a:lnTo>
+                    <a:pt x="120867" y="1781528"/>
+                  </a:lnTo>
+                  <a:lnTo>
+                    <a:pt x="181879" y="1791078"/>
+                  </a:lnTo>
+                  <a:lnTo>
+                    <a:pt x="243182" y="1798539"/>
+                  </a:lnTo>
+                  <a:lnTo>
+                    <a:pt x="304703" y="1803903"/>
+                  </a:lnTo>
+                  <a:lnTo>
+                    <a:pt x="366372" y="1807163"/>
+                  </a:lnTo>
+                  <a:lnTo>
+                    <a:pt x="428116" y="1808315"/>
+                  </a:lnTo>
+                  <a:lnTo>
+                    <a:pt x="489863" y="1807358"/>
+                  </a:lnTo>
+                  <a:lnTo>
+                    <a:pt x="551542" y="1804293"/>
+                  </a:lnTo>
+                  <a:lnTo>
+                    <a:pt x="613080" y="1799124"/>
+                  </a:lnTo>
+                  <a:lnTo>
+                    <a:pt x="674405" y="1791857"/>
+                  </a:lnTo>
+                  <a:lnTo>
+                    <a:pt x="735447" y="1782501"/>
+                  </a:lnTo>
+                  <a:lnTo>
+                    <a:pt x="796134" y="1771065"/>
+                  </a:lnTo>
+                  <a:lnTo>
+                    <a:pt x="856395" y="1757564"/>
+                  </a:lnTo>
+                  <a:lnTo>
+                    <a:pt x="916159" y="1742013"/>
+                  </a:lnTo>
+                  <a:lnTo>
+                    <a:pt x="975358" y="1724430"/>
+                  </a:lnTo>
+                  <a:lnTo>
+                    <a:pt x="1033922" y="1704837"/>
+                  </a:lnTo>
+                  <a:lnTo>
+                    <a:pt x="1091783" y="1683255"/>
+                  </a:lnTo>
+                  <a:lnTo>
+                    <a:pt x="1148873" y="1659710"/>
+                  </a:lnTo>
+                  <a:lnTo>
+                    <a:pt x="1205126" y="1634229"/>
+                  </a:lnTo>
+                  <a:lnTo>
+                    <a:pt x="1260476" y="1606842"/>
+                  </a:lnTo>
+                  <a:lnTo>
+                    <a:pt x="1314858" y="1577582"/>
+                  </a:lnTo>
+                  <a:lnTo>
+                    <a:pt x="1368210" y="1546481"/>
+                  </a:lnTo>
+                  <a:lnTo>
+                    <a:pt x="1420469" y="1513577"/>
+                  </a:lnTo>
+                  <a:lnTo>
+                    <a:pt x="1471574" y="1478908"/>
+                  </a:lnTo>
+                  <a:lnTo>
+                    <a:pt x="1521465" y="1442514"/>
+                  </a:lnTo>
+                  <a:lnTo>
+                    <a:pt x="1570084" y="1404438"/>
+                  </a:lnTo>
+                  <a:lnTo>
+                    <a:pt x="1617375" y="1364724"/>
+                  </a:lnTo>
+                  <a:lnTo>
+                    <a:pt x="1663282" y="1323418"/>
+                  </a:lnTo>
+                  <a:lnTo>
+                    <a:pt x="1707752" y="1280568"/>
+                  </a:lnTo>
+                  <a:lnTo>
+                    <a:pt x="1750733" y="1236226"/>
+                  </a:lnTo>
+                  <a:lnTo>
+                    <a:pt x="1792175" y="1190441"/>
+                  </a:lnTo>
+                  <a:lnTo>
+                    <a:pt x="1832030" y="1143268"/>
+                  </a:lnTo>
+                  <a:lnTo>
+                    <a:pt x="1870250" y="1094762"/>
+                  </a:lnTo>
+                  <a:lnTo>
+                    <a:pt x="1906792" y="1044979"/>
+                  </a:lnTo>
+                  <a:lnTo>
+                    <a:pt x="1941613" y="993978"/>
+                  </a:lnTo>
+                  <a:lnTo>
+                    <a:pt x="1974671" y="941817"/>
+                  </a:lnTo>
+                  <a:lnTo>
+                    <a:pt x="2005930" y="888557"/>
+                  </a:lnTo>
+                  <a:lnTo>
+                    <a:pt x="2035352" y="834262"/>
+                  </a:lnTo>
+                  <a:lnTo>
+                    <a:pt x="2062902" y="778993"/>
+                  </a:lnTo>
+                  <a:lnTo>
+                    <a:pt x="2088550" y="722816"/>
+                  </a:lnTo>
+                  <a:lnTo>
+                    <a:pt x="2112264" y="665796"/>
+                  </a:lnTo>
+                  <a:lnTo>
+                    <a:pt x="2134018" y="608000"/>
+                  </a:lnTo>
+                  <a:lnTo>
+                    <a:pt x="2153785" y="549494"/>
+                  </a:lnTo>
+                  <a:lnTo>
+                    <a:pt x="2171543" y="490348"/>
+                  </a:lnTo>
+                  <a:lnTo>
+                    <a:pt x="2187271" y="430630"/>
+                  </a:lnTo>
+                  <a:lnTo>
+                    <a:pt x="2200951" y="370409"/>
+                  </a:lnTo>
+                  <a:lnTo>
+                    <a:pt x="2212567" y="309757"/>
+                  </a:lnTo>
+                  <a:lnTo>
+                    <a:pt x="2222105" y="248743"/>
+                  </a:lnTo>
+                  <a:lnTo>
+                    <a:pt x="2229554" y="187439"/>
+                  </a:lnTo>
+                  <a:lnTo>
+                    <a:pt x="2167534" y="180976"/>
+                  </a:lnTo>
+                  <a:lnTo>
+                    <a:pt x="2105514" y="174512"/>
+                  </a:lnTo>
+                  <a:lnTo>
+                    <a:pt x="2043494" y="168049"/>
+                  </a:lnTo>
+                  <a:lnTo>
+                    <a:pt x="1981474" y="161585"/>
+                  </a:lnTo>
+                  <a:lnTo>
+                    <a:pt x="1919454" y="155122"/>
+                  </a:lnTo>
+                  <a:lnTo>
+                    <a:pt x="1857434" y="148659"/>
+                  </a:lnTo>
+                  <a:lnTo>
+                    <a:pt x="1795415" y="142195"/>
+                  </a:lnTo>
+                  <a:lnTo>
+                    <a:pt x="1733395" y="135732"/>
+                  </a:lnTo>
+                  <a:lnTo>
+                    <a:pt x="1671375" y="129268"/>
+                  </a:lnTo>
+                  <a:lnTo>
+                    <a:pt x="1609355" y="122805"/>
+                  </a:lnTo>
+                  <a:lnTo>
+                    <a:pt x="1547335" y="116341"/>
+                  </a:lnTo>
+                  <a:lnTo>
+                    <a:pt x="1485315" y="109878"/>
+                  </a:lnTo>
+                  <a:lnTo>
+                    <a:pt x="1423295" y="103414"/>
+                  </a:lnTo>
+                  <a:lnTo>
+                    <a:pt x="1361275" y="96951"/>
+                  </a:lnTo>
+                  <a:lnTo>
+                    <a:pt x="1299255" y="90488"/>
+                  </a:lnTo>
+                  <a:lnTo>
+                    <a:pt x="1237236" y="84024"/>
+                  </a:lnTo>
+                  <a:lnTo>
+                    <a:pt x="1175216" y="77561"/>
+                  </a:lnTo>
+                  <a:lnTo>
+                    <a:pt x="1113196" y="71097"/>
+                  </a:lnTo>
+                  <a:lnTo>
+                    <a:pt x="1051176" y="64634"/>
+                  </a:lnTo>
+                  <a:lnTo>
+                    <a:pt x="989156" y="58170"/>
+                  </a:lnTo>
+                  <a:lnTo>
+                    <a:pt x="927136" y="51707"/>
+                  </a:lnTo>
+                  <a:lnTo>
+                    <a:pt x="865116" y="45244"/>
+                  </a:lnTo>
+                  <a:lnTo>
+                    <a:pt x="803096" y="38780"/>
+                  </a:lnTo>
+                  <a:lnTo>
+                    <a:pt x="741076" y="32317"/>
+                  </a:lnTo>
+                  <a:lnTo>
+                    <a:pt x="679057" y="25853"/>
+                  </a:lnTo>
+                  <a:lnTo>
+                    <a:pt x="617037" y="19390"/>
+                  </a:lnTo>
+                  <a:lnTo>
+                    <a:pt x="555017" y="12926"/>
+                  </a:lnTo>
+                  <a:lnTo>
+                    <a:pt x="492997" y="6463"/>
                   </a:lnTo>
                   <a:close/>
                 </a:path>
@@ -4277,471 +4307,441 @@
           </p:nvSpPr>
           <p:spPr>
             <a:xfrm>
-              <a:off x="3074326" y="1973107"/>
-              <a:ext cx="1962046" cy="3616381"/>
+              <a:off x="3074263" y="1973107"/>
+              <a:ext cx="1808316" cy="3564526"/>
             </a:xfrm>
             <a:custGeom>
               <a:avLst/>
               <a:pathLst>
-                <a:path w="1962046" h="3616381">
+                <a:path w="1808316" h="3564526">
                   <a:moveTo>
-                    <a:pt x="1808254" y="1808317"/>
+                    <a:pt x="1808316" y="1808317"/>
                   </a:moveTo>
                   <a:lnTo>
-                    <a:pt x="1808254" y="1745961"/>
-                  </a:lnTo>
-                  <a:lnTo>
-                    <a:pt x="1808254" y="1683605"/>
-                  </a:lnTo>
-                  <a:lnTo>
-                    <a:pt x="1808254" y="1621250"/>
-                  </a:lnTo>
-                  <a:lnTo>
-                    <a:pt x="1808254" y="1558894"/>
-                  </a:lnTo>
-                  <a:lnTo>
-                    <a:pt x="1808254" y="1496538"/>
-                  </a:lnTo>
-                  <a:lnTo>
-                    <a:pt x="1808254" y="1434182"/>
-                  </a:lnTo>
-                  <a:lnTo>
-                    <a:pt x="1808254" y="1371827"/>
-                  </a:lnTo>
-                  <a:lnTo>
-                    <a:pt x="1808254" y="1309471"/>
-                  </a:lnTo>
-                  <a:lnTo>
-                    <a:pt x="1808254" y="1247115"/>
-                  </a:lnTo>
-                  <a:lnTo>
-                    <a:pt x="1808254" y="1184759"/>
-                  </a:lnTo>
-                  <a:lnTo>
-                    <a:pt x="1808254" y="1122403"/>
-                  </a:lnTo>
-                  <a:lnTo>
-                    <a:pt x="1808254" y="1060048"/>
-                  </a:lnTo>
-                  <a:lnTo>
-                    <a:pt x="1808254" y="997692"/>
-                  </a:lnTo>
-                  <a:lnTo>
-                    <a:pt x="1808254" y="935336"/>
-                  </a:lnTo>
-                  <a:lnTo>
-                    <a:pt x="1808254" y="872980"/>
-                  </a:lnTo>
-                  <a:lnTo>
-                    <a:pt x="1808254" y="810625"/>
-                  </a:lnTo>
-                  <a:lnTo>
-                    <a:pt x="1808254" y="748269"/>
-                  </a:lnTo>
-                  <a:lnTo>
-                    <a:pt x="1808254" y="685913"/>
-                  </a:lnTo>
-                  <a:lnTo>
-                    <a:pt x="1808254" y="623557"/>
-                  </a:lnTo>
-                  <a:lnTo>
-                    <a:pt x="1808254" y="561201"/>
-                  </a:lnTo>
-                  <a:lnTo>
-                    <a:pt x="1808254" y="498846"/>
-                  </a:lnTo>
-                  <a:lnTo>
-                    <a:pt x="1808254" y="436490"/>
-                  </a:lnTo>
-                  <a:lnTo>
-                    <a:pt x="1808254" y="374134"/>
-                  </a:lnTo>
-                  <a:lnTo>
-                    <a:pt x="1808254" y="311778"/>
-                  </a:lnTo>
-                  <a:lnTo>
-                    <a:pt x="1808254" y="249423"/>
-                  </a:lnTo>
-                  <a:lnTo>
-                    <a:pt x="1808254" y="187067"/>
-                  </a:lnTo>
-                  <a:lnTo>
-                    <a:pt x="1808254" y="124711"/>
-                  </a:lnTo>
-                  <a:lnTo>
-                    <a:pt x="1808254" y="62355"/>
-                  </a:lnTo>
-                  <a:lnTo>
-                    <a:pt x="1808254" y="0"/>
-                  </a:lnTo>
-                  <a:lnTo>
-                    <a:pt x="1746845" y="1043"/>
-                  </a:lnTo>
-                  <a:lnTo>
-                    <a:pt x="1685506" y="4170"/>
-                  </a:lnTo>
-                  <a:lnTo>
-                    <a:pt x="1624310" y="9379"/>
-                  </a:lnTo>
-                  <a:lnTo>
-                    <a:pt x="1563326" y="16663"/>
-                  </a:lnTo>
-                  <a:lnTo>
-                    <a:pt x="1502624" y="26014"/>
-                  </a:lnTo>
-                  <a:lnTo>
-                    <a:pt x="1442274" y="37421"/>
-                  </a:lnTo>
-                  <a:lnTo>
-                    <a:pt x="1382347" y="50871"/>
-                  </a:lnTo>
-                  <a:lnTo>
-                    <a:pt x="1322912" y="66348"/>
-                  </a:lnTo>
-                  <a:lnTo>
-                    <a:pt x="1264036" y="83835"/>
-                  </a:lnTo>
-                  <a:lnTo>
-                    <a:pt x="1205788" y="103311"/>
-                  </a:lnTo>
-                  <a:lnTo>
-                    <a:pt x="1148234" y="124753"/>
-                  </a:lnTo>
-                  <a:lnTo>
-                    <a:pt x="1091443" y="148138"/>
-                  </a:lnTo>
-                  <a:lnTo>
-                    <a:pt x="1035478" y="173438"/>
-                  </a:lnTo>
-                  <a:lnTo>
-                    <a:pt x="980404" y="200624"/>
-                  </a:lnTo>
-                  <a:lnTo>
-                    <a:pt x="926286" y="229664"/>
-                  </a:lnTo>
-                  <a:lnTo>
-                    <a:pt x="873185" y="260525"/>
-                  </a:lnTo>
-                  <a:lnTo>
-                    <a:pt x="821162" y="293172"/>
-                  </a:lnTo>
-                  <a:lnTo>
-                    <a:pt x="770279" y="327567"/>
-                  </a:lnTo>
-                  <a:lnTo>
-                    <a:pt x="720592" y="363670"/>
-                  </a:lnTo>
-                  <a:lnTo>
-                    <a:pt x="672161" y="401439"/>
-                  </a:lnTo>
-                  <a:lnTo>
-                    <a:pt x="625039" y="440832"/>
-                  </a:lnTo>
-                  <a:lnTo>
-                    <a:pt x="579283" y="481801"/>
-                  </a:lnTo>
-                  <a:lnTo>
-                    <a:pt x="534945" y="524301"/>
-                  </a:lnTo>
-                  <a:lnTo>
-                    <a:pt x="492075" y="568282"/>
-                  </a:lnTo>
-                  <a:lnTo>
-                    <a:pt x="450724" y="613694"/>
-                  </a:lnTo>
-                  <a:lnTo>
-                    <a:pt x="410938" y="660483"/>
-                  </a:lnTo>
-                  <a:lnTo>
-                    <a:pt x="372765" y="708597"/>
-                  </a:lnTo>
-                  <a:lnTo>
-                    <a:pt x="336247" y="757980"/>
-                  </a:lnTo>
-                  <a:lnTo>
-                    <a:pt x="301427" y="808574"/>
-                  </a:lnTo>
-                  <a:lnTo>
-                    <a:pt x="268346" y="860321"/>
-                  </a:lnTo>
-                  <a:lnTo>
-                    <a:pt x="237041" y="913162"/>
-                  </a:lnTo>
-                  <a:lnTo>
-                    <a:pt x="207549" y="967035"/>
-                  </a:lnTo>
-                  <a:lnTo>
-                    <a:pt x="179903" y="1021879"/>
-                  </a:lnTo>
-                  <a:lnTo>
-                    <a:pt x="154135" y="1077630"/>
-                  </a:lnTo>
-                  <a:lnTo>
-                    <a:pt x="130275" y="1134224"/>
-                  </a:lnTo>
-                  <a:lnTo>
-                    <a:pt x="108352" y="1191595"/>
-                  </a:lnTo>
-                  <a:lnTo>
-                    <a:pt x="88389" y="1249678"/>
-                  </a:lnTo>
-                  <a:lnTo>
-                    <a:pt x="70410" y="1308406"/>
-                  </a:lnTo>
-                  <a:lnTo>
-                    <a:pt x="54436" y="1367710"/>
-                  </a:lnTo>
-                  <a:lnTo>
-                    <a:pt x="40485" y="1427522"/>
-                  </a:lnTo>
-                  <a:lnTo>
-                    <a:pt x="28573" y="1487774"/>
-                  </a:lnTo>
-                  <a:lnTo>
-                    <a:pt x="18714" y="1548395"/>
-                  </a:lnTo>
-                  <a:lnTo>
-                    <a:pt x="10919" y="1609316"/>
-                  </a:lnTo>
-                  <a:lnTo>
-                    <a:pt x="5198" y="1670467"/>
-                  </a:lnTo>
-                  <a:lnTo>
-                    <a:pt x="1557" y="1731777"/>
-                  </a:lnTo>
-                  <a:lnTo>
-                    <a:pt x="0" y="1793175"/>
-                  </a:lnTo>
-                  <a:lnTo>
-                    <a:pt x="528" y="1854591"/>
-                  </a:lnTo>
-                  <a:lnTo>
-                    <a:pt x="3142" y="1915953"/>
-                  </a:lnTo>
-                  <a:lnTo>
-                    <a:pt x="7839" y="1977191"/>
-                  </a:lnTo>
-                  <a:lnTo>
-                    <a:pt x="14612" y="2038234"/>
-                  </a:lnTo>
-                  <a:lnTo>
-                    <a:pt x="23454" y="2099012"/>
-                  </a:lnTo>
-                  <a:lnTo>
-                    <a:pt x="34356" y="2159455"/>
-                  </a:lnTo>
-                  <a:lnTo>
-                    <a:pt x="47303" y="2219492"/>
-                  </a:lnTo>
-                  <a:lnTo>
-                    <a:pt x="62282" y="2279056"/>
-                  </a:lnTo>
-                  <a:lnTo>
-                    <a:pt x="79275" y="2338076"/>
-                  </a:lnTo>
-                  <a:lnTo>
-                    <a:pt x="98262" y="2396485"/>
-                  </a:lnTo>
-                  <a:lnTo>
-                    <a:pt x="119222" y="2454216"/>
-                  </a:lnTo>
-                  <a:lnTo>
-                    <a:pt x="142131" y="2511201"/>
-                  </a:lnTo>
-                  <a:lnTo>
-                    <a:pt x="166961" y="2567376"/>
-                  </a:lnTo>
-                  <a:lnTo>
-                    <a:pt x="193685" y="2622675"/>
-                  </a:lnTo>
-                  <a:lnTo>
-                    <a:pt x="222271" y="2677035"/>
-                  </a:lnTo>
-                  <a:lnTo>
-                    <a:pt x="252687" y="2730393"/>
-                  </a:lnTo>
-                  <a:lnTo>
-                    <a:pt x="284897" y="2782687"/>
-                  </a:lnTo>
-                  <a:lnTo>
-                    <a:pt x="318864" y="2833857"/>
-                  </a:lnTo>
-                  <a:lnTo>
-                    <a:pt x="354550" y="2883843"/>
-                  </a:lnTo>
-                  <a:lnTo>
-                    <a:pt x="391912" y="2932590"/>
-                  </a:lnTo>
-                  <a:lnTo>
-                    <a:pt x="430909" y="2980039"/>
-                  </a:lnTo>
-                  <a:lnTo>
-                    <a:pt x="471494" y="3026137"/>
-                  </a:lnTo>
-                  <a:lnTo>
-                    <a:pt x="513621" y="3070830"/>
-                  </a:lnTo>
-                  <a:lnTo>
-                    <a:pt x="557241" y="3114066"/>
-                  </a:lnTo>
-                  <a:lnTo>
-                    <a:pt x="602305" y="3155796"/>
-                  </a:lnTo>
-                  <a:lnTo>
-                    <a:pt x="648760" y="3195972"/>
-                  </a:lnTo>
-                  <a:lnTo>
-                    <a:pt x="696552" y="3234547"/>
-                  </a:lnTo>
-                  <a:lnTo>
-                    <a:pt x="745627" y="3271477"/>
-                  </a:lnTo>
-                  <a:lnTo>
-                    <a:pt x="795928" y="3306719"/>
-                  </a:lnTo>
-                  <a:lnTo>
-                    <a:pt x="847396" y="3340233"/>
-                  </a:lnTo>
-                  <a:lnTo>
-                    <a:pt x="899973" y="3371979"/>
-                  </a:lnTo>
-                  <a:lnTo>
-                    <a:pt x="953598" y="3401921"/>
-                  </a:lnTo>
-                  <a:lnTo>
-                    <a:pt x="1008208" y="3430026"/>
-                  </a:lnTo>
-                  <a:lnTo>
-                    <a:pt x="1063741" y="3456259"/>
-                  </a:lnTo>
-                  <a:lnTo>
-                    <a:pt x="1120134" y="3480592"/>
-                  </a:lnTo>
-                  <a:lnTo>
-                    <a:pt x="1177320" y="3502995"/>
-                  </a:lnTo>
-                  <a:lnTo>
-                    <a:pt x="1235233" y="3523444"/>
-                  </a:lnTo>
-                  <a:lnTo>
-                    <a:pt x="1293808" y="3541914"/>
-                  </a:lnTo>
-                  <a:lnTo>
-                    <a:pt x="1352977" y="3558384"/>
-                  </a:lnTo>
-                  <a:lnTo>
-                    <a:pt x="1412670" y="3572835"/>
-                  </a:lnTo>
-                  <a:lnTo>
-                    <a:pt x="1472820" y="3585251"/>
-                  </a:lnTo>
-                  <a:lnTo>
-                    <a:pt x="1533356" y="3595618"/>
-                  </a:lnTo>
-                  <a:lnTo>
-                    <a:pt x="1594210" y="3603922"/>
-                  </a:lnTo>
-                  <a:lnTo>
-                    <a:pt x="1655311" y="3610155"/>
-                  </a:lnTo>
-                  <a:lnTo>
-                    <a:pt x="1716588" y="3614310"/>
-                  </a:lnTo>
-                  <a:lnTo>
-                    <a:pt x="1777971" y="3616381"/>
-                  </a:lnTo>
-                  <a:lnTo>
-                    <a:pt x="1839389" y="3616366"/>
-                  </a:lnTo>
-                  <a:lnTo>
-                    <a:pt x="1900771" y="3614266"/>
-                  </a:lnTo>
-                  <a:lnTo>
-                    <a:pt x="1962046" y="3610083"/>
-                  </a:lnTo>
-                  <a:lnTo>
-                    <a:pt x="1956743" y="3547953"/>
-                  </a:lnTo>
-                  <a:lnTo>
-                    <a:pt x="1951440" y="3485823"/>
-                  </a:lnTo>
-                  <a:lnTo>
-                    <a:pt x="1946136" y="3423693"/>
-                  </a:lnTo>
-                  <a:lnTo>
-                    <a:pt x="1940833" y="3361563"/>
-                  </a:lnTo>
-                  <a:lnTo>
-                    <a:pt x="1935530" y="3299433"/>
-                  </a:lnTo>
-                  <a:lnTo>
-                    <a:pt x="1930227" y="3237304"/>
-                  </a:lnTo>
-                  <a:lnTo>
-                    <a:pt x="1924924" y="3175174"/>
-                  </a:lnTo>
-                  <a:lnTo>
-                    <a:pt x="1919621" y="3113044"/>
-                  </a:lnTo>
-                  <a:lnTo>
-                    <a:pt x="1914317" y="3050914"/>
-                  </a:lnTo>
-                  <a:lnTo>
-                    <a:pt x="1909014" y="2988784"/>
-                  </a:lnTo>
-                  <a:lnTo>
-                    <a:pt x="1903711" y="2926654"/>
-                  </a:lnTo>
-                  <a:lnTo>
-                    <a:pt x="1898408" y="2864524"/>
-                  </a:lnTo>
-                  <a:lnTo>
-                    <a:pt x="1893105" y="2802395"/>
-                  </a:lnTo>
-                  <a:lnTo>
-                    <a:pt x="1887801" y="2740265"/>
-                  </a:lnTo>
-                  <a:lnTo>
-                    <a:pt x="1882498" y="2678135"/>
-                  </a:lnTo>
-                  <a:lnTo>
-                    <a:pt x="1877195" y="2616005"/>
-                  </a:lnTo>
-                  <a:lnTo>
-                    <a:pt x="1871892" y="2553875"/>
-                  </a:lnTo>
-                  <a:lnTo>
-                    <a:pt x="1866589" y="2491745"/>
-                  </a:lnTo>
-                  <a:lnTo>
-                    <a:pt x="1861285" y="2429615"/>
-                  </a:lnTo>
-                  <a:lnTo>
-                    <a:pt x="1855982" y="2367486"/>
-                  </a:lnTo>
-                  <a:lnTo>
-                    <a:pt x="1850679" y="2305356"/>
-                  </a:lnTo>
-                  <a:lnTo>
-                    <a:pt x="1845376" y="2243226"/>
-                  </a:lnTo>
-                  <a:lnTo>
-                    <a:pt x="1840073" y="2181096"/>
-                  </a:lnTo>
-                  <a:lnTo>
-                    <a:pt x="1834769" y="2118966"/>
-                  </a:lnTo>
-                  <a:lnTo>
-                    <a:pt x="1829466" y="2056836"/>
-                  </a:lnTo>
-                  <a:lnTo>
-                    <a:pt x="1824163" y="1994707"/>
-                  </a:lnTo>
-                  <a:lnTo>
-                    <a:pt x="1818860" y="1932577"/>
-                  </a:lnTo>
-                  <a:lnTo>
-                    <a:pt x="1813557" y="1870447"/>
+                    <a:pt x="1808316" y="1745961"/>
+                  </a:lnTo>
+                  <a:lnTo>
+                    <a:pt x="1808316" y="1683605"/>
+                  </a:lnTo>
+                  <a:lnTo>
+                    <a:pt x="1808316" y="1621250"/>
+                  </a:lnTo>
+                  <a:lnTo>
+                    <a:pt x="1808316" y="1558894"/>
+                  </a:lnTo>
+                  <a:lnTo>
+                    <a:pt x="1808316" y="1496538"/>
+                  </a:lnTo>
+                  <a:lnTo>
+                    <a:pt x="1808316" y="1434182"/>
+                  </a:lnTo>
+                  <a:lnTo>
+                    <a:pt x="1808316" y="1371827"/>
+                  </a:lnTo>
+                  <a:lnTo>
+                    <a:pt x="1808316" y="1309471"/>
+                  </a:lnTo>
+                  <a:lnTo>
+                    <a:pt x="1808316" y="1247115"/>
+                  </a:lnTo>
+                  <a:lnTo>
+                    <a:pt x="1808316" y="1184759"/>
+                  </a:lnTo>
+                  <a:lnTo>
+                    <a:pt x="1808316" y="1122403"/>
+                  </a:lnTo>
+                  <a:lnTo>
+                    <a:pt x="1808316" y="1060048"/>
+                  </a:lnTo>
+                  <a:lnTo>
+                    <a:pt x="1808316" y="997692"/>
+                  </a:lnTo>
+                  <a:lnTo>
+                    <a:pt x="1808316" y="935336"/>
+                  </a:lnTo>
+                  <a:lnTo>
+                    <a:pt x="1808316" y="872980"/>
+                  </a:lnTo>
+                  <a:lnTo>
+                    <a:pt x="1808316" y="810625"/>
+                  </a:lnTo>
+                  <a:lnTo>
+                    <a:pt x="1808316" y="748269"/>
+                  </a:lnTo>
+                  <a:lnTo>
+                    <a:pt x="1808316" y="685913"/>
+                  </a:lnTo>
+                  <a:lnTo>
+                    <a:pt x="1808316" y="623557"/>
+                  </a:lnTo>
+                  <a:lnTo>
+                    <a:pt x="1808316" y="561201"/>
+                  </a:lnTo>
+                  <a:lnTo>
+                    <a:pt x="1808316" y="498846"/>
+                  </a:lnTo>
+                  <a:lnTo>
+                    <a:pt x="1808316" y="436490"/>
+                  </a:lnTo>
+                  <a:lnTo>
+                    <a:pt x="1808316" y="374134"/>
+                  </a:lnTo>
+                  <a:lnTo>
+                    <a:pt x="1808316" y="311778"/>
+                  </a:lnTo>
+                  <a:lnTo>
+                    <a:pt x="1808316" y="249423"/>
+                  </a:lnTo>
+                  <a:lnTo>
+                    <a:pt x="1808316" y="187067"/>
+                  </a:lnTo>
+                  <a:lnTo>
+                    <a:pt x="1808316" y="124711"/>
+                  </a:lnTo>
+                  <a:lnTo>
+                    <a:pt x="1808316" y="62355"/>
+                  </a:lnTo>
+                  <a:lnTo>
+                    <a:pt x="1808316" y="0"/>
+                  </a:lnTo>
+                  <a:lnTo>
+                    <a:pt x="1746613" y="1053"/>
+                  </a:lnTo>
+                  <a:lnTo>
+                    <a:pt x="1684981" y="4210"/>
+                  </a:lnTo>
+                  <a:lnTo>
+                    <a:pt x="1623493" y="9469"/>
+                  </a:lnTo>
+                  <a:lnTo>
+                    <a:pt x="1562220" y="16824"/>
+                  </a:lnTo>
+                  <a:lnTo>
+                    <a:pt x="1501233" y="26264"/>
+                  </a:lnTo>
+                  <a:lnTo>
+                    <a:pt x="1440605" y="37780"/>
+                  </a:lnTo>
+                  <a:lnTo>
+                    <a:pt x="1380404" y="51358"/>
+                  </a:lnTo>
+                  <a:lnTo>
+                    <a:pt x="1320702" y="66983"/>
+                  </a:lnTo>
+                  <a:lnTo>
+                    <a:pt x="1261568" y="84635"/>
+                  </a:lnTo>
+                  <a:lnTo>
+                    <a:pt x="1203071" y="104295"/>
+                  </a:lnTo>
+                  <a:lnTo>
+                    <a:pt x="1145278" y="125940"/>
+                  </a:lnTo>
+                  <a:lnTo>
+                    <a:pt x="1088258" y="149544"/>
+                  </a:lnTo>
+                  <a:lnTo>
+                    <a:pt x="1032077" y="175080"/>
+                  </a:lnTo>
+                  <a:lnTo>
+                    <a:pt x="976799" y="202518"/>
+                  </a:lnTo>
+                  <a:lnTo>
+                    <a:pt x="922490" y="231826"/>
+                  </a:lnTo>
+                  <a:lnTo>
+                    <a:pt x="869213" y="262970"/>
+                  </a:lnTo>
+                  <a:lnTo>
+                    <a:pt x="817029" y="295914"/>
+                  </a:lnTo>
+                  <a:lnTo>
+                    <a:pt x="766000" y="330620"/>
+                  </a:lnTo>
+                  <a:lnTo>
+                    <a:pt x="716184" y="367047"/>
+                  </a:lnTo>
+                  <a:lnTo>
+                    <a:pt x="667641" y="405152"/>
+                  </a:lnTo>
+                  <a:lnTo>
+                    <a:pt x="620426" y="444891"/>
+                  </a:lnTo>
+                  <a:lnTo>
+                    <a:pt x="574595" y="486219"/>
+                  </a:lnTo>
+                  <a:lnTo>
+                    <a:pt x="530201" y="529086"/>
+                  </a:lnTo>
+                  <a:lnTo>
+                    <a:pt x="487295" y="573443"/>
+                  </a:lnTo>
+                  <a:lnTo>
+                    <a:pt x="445928" y="619238"/>
+                  </a:lnTo>
+                  <a:lnTo>
+                    <a:pt x="406147" y="666418"/>
+                  </a:lnTo>
+                  <a:lnTo>
+                    <a:pt x="368000" y="714928"/>
+                  </a:lnTo>
+                  <a:lnTo>
+                    <a:pt x="331529" y="764711"/>
+                  </a:lnTo>
+                  <a:lnTo>
+                    <a:pt x="296779" y="815710"/>
+                  </a:lnTo>
+                  <a:lnTo>
+                    <a:pt x="263790" y="867865"/>
+                  </a:lnTo>
+                  <a:lnTo>
+                    <a:pt x="232599" y="921115"/>
+                  </a:lnTo>
+                  <a:lnTo>
+                    <a:pt x="203243" y="975399"/>
+                  </a:lnTo>
+                  <a:lnTo>
+                    <a:pt x="175757" y="1030652"/>
+                  </a:lnTo>
+                  <a:lnTo>
+                    <a:pt x="150172" y="1086812"/>
+                  </a:lnTo>
+                  <a:lnTo>
+                    <a:pt x="126518" y="1143811"/>
+                  </a:lnTo>
+                  <a:lnTo>
+                    <a:pt x="104823" y="1201585"/>
+                  </a:lnTo>
+                  <a:lnTo>
+                    <a:pt x="85112" y="1260065"/>
+                  </a:lnTo>
+                  <a:lnTo>
+                    <a:pt x="67408" y="1319184"/>
+                  </a:lnTo>
+                  <a:lnTo>
+                    <a:pt x="51732" y="1378872"/>
+                  </a:lnTo>
+                  <a:lnTo>
+                    <a:pt x="38101" y="1439061"/>
+                  </a:lnTo>
+                  <a:lnTo>
+                    <a:pt x="26532" y="1499679"/>
+                  </a:lnTo>
+                  <a:lnTo>
+                    <a:pt x="17038" y="1560657"/>
+                  </a:lnTo>
+                  <a:lnTo>
+                    <a:pt x="9631" y="1621924"/>
+                  </a:lnTo>
+                  <a:lnTo>
+                    <a:pt x="4318" y="1683407"/>
+                  </a:lnTo>
+                  <a:lnTo>
+                    <a:pt x="1106" y="1745036"/>
+                  </a:lnTo>
+                  <a:lnTo>
+                    <a:pt x="0" y="1806739"/>
+                  </a:lnTo>
+                  <a:lnTo>
+                    <a:pt x="999" y="1868444"/>
+                  </a:lnTo>
+                  <a:lnTo>
+                    <a:pt x="4103" y="1930078"/>
+                  </a:lnTo>
+                  <a:lnTo>
+                    <a:pt x="9308" y="1991571"/>
+                  </a:lnTo>
+                  <a:lnTo>
+                    <a:pt x="16609" y="2052850"/>
+                  </a:lnTo>
+                  <a:lnTo>
+                    <a:pt x="25996" y="2113845"/>
+                  </a:lnTo>
+                  <a:lnTo>
+                    <a:pt x="37459" y="2174483"/>
+                  </a:lnTo>
+                  <a:lnTo>
+                    <a:pt x="50985" y="2234696"/>
+                  </a:lnTo>
+                  <a:lnTo>
+                    <a:pt x="66557" y="2294411"/>
+                  </a:lnTo>
+                  <a:lnTo>
+                    <a:pt x="84158" y="2353561"/>
+                  </a:lnTo>
+                  <a:lnTo>
+                    <a:pt x="103767" y="2412075"/>
+                  </a:lnTo>
+                  <a:lnTo>
+                    <a:pt x="125361" y="2469886"/>
+                  </a:lnTo>
+                  <a:lnTo>
+                    <a:pt x="148915" y="2526927"/>
+                  </a:lnTo>
+                  <a:lnTo>
+                    <a:pt x="174402" y="2583131"/>
+                  </a:lnTo>
+                  <a:lnTo>
+                    <a:pt x="201792" y="2638433"/>
+                  </a:lnTo>
+                  <a:lnTo>
+                    <a:pt x="231053" y="2692767"/>
+                  </a:lnTo>
+                  <a:lnTo>
+                    <a:pt x="262151" y="2746072"/>
+                  </a:lnTo>
+                  <a:lnTo>
+                    <a:pt x="295049" y="2798284"/>
+                  </a:lnTo>
+                  <a:lnTo>
+                    <a:pt x="329710" y="2849344"/>
+                  </a:lnTo>
+                  <a:lnTo>
+                    <a:pt x="366093" y="2899191"/>
+                  </a:lnTo>
+                  <a:lnTo>
+                    <a:pt x="404156" y="2947767"/>
+                  </a:lnTo>
+                  <a:lnTo>
+                    <a:pt x="443854" y="2995017"/>
+                  </a:lnTo>
+                  <a:lnTo>
+                    <a:pt x="485142" y="3040884"/>
+                  </a:lnTo>
+                  <a:lnTo>
+                    <a:pt x="527970" y="3085316"/>
+                  </a:lnTo>
+                  <a:lnTo>
+                    <a:pt x="572290" y="3128260"/>
+                  </a:lnTo>
+                  <a:lnTo>
+                    <a:pt x="618049" y="3169667"/>
+                  </a:lnTo>
+                  <a:lnTo>
+                    <a:pt x="665194" y="3209489"/>
+                  </a:lnTo>
+                  <a:lnTo>
+                    <a:pt x="713671" y="3247679"/>
+                  </a:lnTo>
+                  <a:lnTo>
+                    <a:pt x="763422" y="3284193"/>
+                  </a:lnTo>
+                  <a:lnTo>
+                    <a:pt x="814391" y="3318987"/>
+                  </a:lnTo>
+                  <a:lnTo>
+                    <a:pt x="866517" y="3352022"/>
+                  </a:lnTo>
+                  <a:lnTo>
+                    <a:pt x="919740" y="3383260"/>
+                  </a:lnTo>
+                  <a:lnTo>
+                    <a:pt x="973998" y="3412663"/>
+                  </a:lnTo>
+                  <a:lnTo>
+                    <a:pt x="1029227" y="3440197"/>
+                  </a:lnTo>
+                  <a:lnTo>
+                    <a:pt x="1085364" y="3465831"/>
+                  </a:lnTo>
+                  <a:lnTo>
+                    <a:pt x="1142343" y="3489534"/>
+                  </a:lnTo>
+                  <a:lnTo>
+                    <a:pt x="1200098" y="3511280"/>
+                  </a:lnTo>
+                  <a:lnTo>
+                    <a:pt x="1258561" y="3531042"/>
+                  </a:lnTo>
+                  <a:lnTo>
+                    <a:pt x="1317664" y="3548797"/>
+                  </a:lnTo>
+                  <a:lnTo>
+                    <a:pt x="1377339" y="3564526"/>
+                  </a:lnTo>
+                  <a:lnTo>
+                    <a:pt x="1392200" y="3503967"/>
+                  </a:lnTo>
+                  <a:lnTo>
+                    <a:pt x="1407061" y="3443408"/>
+                  </a:lnTo>
+                  <a:lnTo>
+                    <a:pt x="1421923" y="3382849"/>
+                  </a:lnTo>
+                  <a:lnTo>
+                    <a:pt x="1436784" y="3322290"/>
+                  </a:lnTo>
+                  <a:lnTo>
+                    <a:pt x="1451645" y="3261731"/>
+                  </a:lnTo>
+                  <a:lnTo>
+                    <a:pt x="1466506" y="3201172"/>
+                  </a:lnTo>
+                  <a:lnTo>
+                    <a:pt x="1481368" y="3140613"/>
+                  </a:lnTo>
+                  <a:lnTo>
+                    <a:pt x="1496229" y="3080055"/>
+                  </a:lnTo>
+                  <a:lnTo>
+                    <a:pt x="1511090" y="3019496"/>
+                  </a:lnTo>
+                  <a:lnTo>
+                    <a:pt x="1525952" y="2958937"/>
+                  </a:lnTo>
+                  <a:lnTo>
+                    <a:pt x="1540813" y="2898378"/>
+                  </a:lnTo>
+                  <a:lnTo>
+                    <a:pt x="1555674" y="2837819"/>
+                  </a:lnTo>
+                  <a:lnTo>
+                    <a:pt x="1570536" y="2777260"/>
+                  </a:lnTo>
+                  <a:lnTo>
+                    <a:pt x="1585397" y="2716701"/>
+                  </a:lnTo>
+                  <a:lnTo>
+                    <a:pt x="1600258" y="2656142"/>
+                  </a:lnTo>
+                  <a:lnTo>
+                    <a:pt x="1615119" y="2595583"/>
+                  </a:lnTo>
+                  <a:lnTo>
+                    <a:pt x="1629981" y="2535024"/>
+                  </a:lnTo>
+                  <a:lnTo>
+                    <a:pt x="1644842" y="2474465"/>
+                  </a:lnTo>
+                  <a:lnTo>
+                    <a:pt x="1659703" y="2413906"/>
+                  </a:lnTo>
+                  <a:lnTo>
+                    <a:pt x="1674565" y="2353347"/>
+                  </a:lnTo>
+                  <a:lnTo>
+                    <a:pt x="1689426" y="2292788"/>
+                  </a:lnTo>
+                  <a:lnTo>
+                    <a:pt x="1704287" y="2232229"/>
+                  </a:lnTo>
+                  <a:lnTo>
+                    <a:pt x="1719148" y="2171671"/>
+                  </a:lnTo>
+                  <a:lnTo>
+                    <a:pt x="1734010" y="2111112"/>
+                  </a:lnTo>
+                  <a:lnTo>
+                    <a:pt x="1748871" y="2050553"/>
+                  </a:lnTo>
+                  <a:lnTo>
+                    <a:pt x="1763732" y="1989994"/>
+                  </a:lnTo>
+                  <a:lnTo>
+                    <a:pt x="1778594" y="1929435"/>
+                  </a:lnTo>
+                  <a:lnTo>
+                    <a:pt x="1793455" y="1868876"/>
                   </a:lnTo>
                   <a:close/>
                 </a:path>
@@ -4776,7 +4776,7 @@
           </p:nvSpPr>
           <p:spPr>
             <a:xfrm>
-              <a:off x="4948028" y="2843326"/>
+              <a:off x="4934208" y="2839965"/>
               <a:ext cx="329449" cy="109040"/>
             </a:xfrm>
             <a:prstGeom prst="rect">
@@ -4809,7 +4809,7 @@
                   <a:latin typeface="Arial"/>
                   <a:cs typeface="Arial"/>
                 </a:rPr>
-                <a:t>7.8%</a:t>
+                <a:t>7.3%</a:t>
               </a:r>
             </a:p>
           </p:txBody>
@@ -4822,8 +4822,8 @@
           </p:nvSpPr>
           <p:spPr>
             <a:xfrm>
-              <a:off x="5357371" y="3071577"/>
-              <a:ext cx="329449" cy="109040"/>
+              <a:off x="5400691" y="3055531"/>
+              <a:ext cx="208905" cy="109040"/>
             </a:xfrm>
             <a:prstGeom prst="rect">
               <a:avLst/>
@@ -4855,7 +4855,7 @@
                   <a:latin typeface="Arial"/>
                   <a:cs typeface="Arial"/>
                 </a:rPr>
-                <a:t>8.8%</a:t>
+                <a:t>9%</a:t>
               </a:r>
             </a:p>
           </p:txBody>
@@ -4868,8 +4868,8 @@
           </p:nvSpPr>
           <p:spPr>
             <a:xfrm>
-              <a:off x="5637522" y="3560935"/>
-              <a:ext cx="289291" cy="109040"/>
+              <a:off x="5569741" y="3523532"/>
+              <a:ext cx="409835" cy="109040"/>
             </a:xfrm>
             <a:prstGeom prst="rect">
               <a:avLst/>
@@ -4901,7 +4901,7 @@
                   <a:latin typeface="Arial"/>
                   <a:cs typeface="Arial"/>
                 </a:rPr>
-                <a:t>11%</a:t>
+                <a:t>10.3%</a:t>
               </a:r>
             </a:p>
           </p:txBody>
@@ -4914,8 +4914,8 @@
           </p:nvSpPr>
           <p:spPr>
             <a:xfrm>
-              <a:off x="5359784" y="4385441"/>
-              <a:ext cx="289291" cy="109040"/>
+              <a:off x="5207519" y="4459612"/>
+              <a:ext cx="409835" cy="109040"/>
             </a:xfrm>
             <a:prstGeom prst="rect">
               <a:avLst/>
@@ -4947,7 +4947,7 @@
                   <a:latin typeface="Arial"/>
                   <a:cs typeface="Arial"/>
                 </a:rPr>
-                <a:t>21%</a:t>
+                <a:t>27.2%</a:t>
               </a:r>
             </a:p>
           </p:txBody>
@@ -4960,7 +4960,7 @@
           </p:nvSpPr>
           <p:spPr>
             <a:xfrm>
-              <a:off x="3783881" y="3758640"/>
+              <a:off x="3789599" y="3611628"/>
               <a:ext cx="409835" cy="109040"/>
             </a:xfrm>
             <a:prstGeom prst="rect">
@@ -4993,7 +4993,7 @@
                   <a:latin typeface="Arial"/>
                   <a:cs typeface="Arial"/>
                 </a:rPr>
-                <a:t>51.4%</a:t>
+                <a:t>46.2%</a:t>
               </a:r>
             </a:p>
           </p:txBody>
@@ -5006,7 +5006,7 @@
           </p:nvSpPr>
           <p:spPr>
             <a:xfrm>
-              <a:off x="4945785" y="2839970"/>
+              <a:off x="4931965" y="2836608"/>
               <a:ext cx="329449" cy="109040"/>
             </a:xfrm>
             <a:prstGeom prst="rect">
@@ -5039,7 +5039,7 @@
                   <a:latin typeface="Arial"/>
                   <a:cs typeface="Arial"/>
                 </a:rPr>
-                <a:t>7.8%</a:t>
+                <a:t>7.3%</a:t>
               </a:r>
             </a:p>
           </p:txBody>
@@ -5052,8 +5052,8 @@
           </p:nvSpPr>
           <p:spPr>
             <a:xfrm>
-              <a:off x="5355128" y="3068220"/>
-              <a:ext cx="329449" cy="109040"/>
+              <a:off x="5398448" y="3052174"/>
+              <a:ext cx="208905" cy="109040"/>
             </a:xfrm>
             <a:prstGeom prst="rect">
               <a:avLst/>
@@ -5085,7 +5085,7 @@
                   <a:latin typeface="Arial"/>
                   <a:cs typeface="Arial"/>
                 </a:rPr>
-                <a:t>8.8%</a:t>
+                <a:t>9%</a:t>
               </a:r>
             </a:p>
           </p:txBody>
@@ -5098,8 +5098,8 @@
           </p:nvSpPr>
           <p:spPr>
             <a:xfrm>
-              <a:off x="5635279" y="3557579"/>
-              <a:ext cx="289291" cy="109040"/>
+              <a:off x="5567498" y="3520175"/>
+              <a:ext cx="409835" cy="109040"/>
             </a:xfrm>
             <a:prstGeom prst="rect">
               <a:avLst/>
@@ -5131,7 +5131,7 @@
                   <a:latin typeface="Arial"/>
                   <a:cs typeface="Arial"/>
                 </a:rPr>
-                <a:t>11%</a:t>
+                <a:t>10.3%</a:t>
               </a:r>
             </a:p>
           </p:txBody>
@@ -5144,8 +5144,8 @@
           </p:nvSpPr>
           <p:spPr>
             <a:xfrm>
-              <a:off x="5357542" y="4382084"/>
-              <a:ext cx="289291" cy="109040"/>
+              <a:off x="5205276" y="4456255"/>
+              <a:ext cx="409835" cy="109040"/>
             </a:xfrm>
             <a:prstGeom prst="rect">
               <a:avLst/>
@@ -5177,7 +5177,7 @@
                   <a:latin typeface="Arial"/>
                   <a:cs typeface="Arial"/>
                 </a:rPr>
-                <a:t>21%</a:t>
+                <a:t>27.2%</a:t>
               </a:r>
             </a:p>
           </p:txBody>
@@ -5190,7 +5190,7 @@
           </p:nvSpPr>
           <p:spPr>
             <a:xfrm>
-              <a:off x="3781639" y="3755284"/>
+              <a:off x="3787356" y="3608272"/>
               <a:ext cx="409835" cy="109040"/>
             </a:xfrm>
             <a:prstGeom prst="rect">
@@ -5223,7 +5223,7 @@
                   <a:latin typeface="Arial"/>
                   <a:cs typeface="Arial"/>
                 </a:rPr>
-                <a:t>51.4%</a:t>
+                <a:t>46.2%</a:t>
               </a:r>
             </a:p>
           </p:txBody>
@@ -5236,7 +5236,7 @@
           </p:nvSpPr>
           <p:spPr>
             <a:xfrm>
-              <a:off x="4942428" y="2837727"/>
+              <a:off x="4928609" y="2834365"/>
               <a:ext cx="329449" cy="109040"/>
             </a:xfrm>
             <a:prstGeom prst="rect">
@@ -5269,7 +5269,7 @@
                   <a:latin typeface="Arial"/>
                   <a:cs typeface="Arial"/>
                 </a:rPr>
-                <a:t>7.8%</a:t>
+                <a:t>7.3%</a:t>
               </a:r>
             </a:p>
           </p:txBody>
@@ -5282,8 +5282,8 @@
           </p:nvSpPr>
           <p:spPr>
             <a:xfrm>
-              <a:off x="5351772" y="3065977"/>
-              <a:ext cx="329449" cy="109040"/>
+              <a:off x="5395091" y="3049931"/>
+              <a:ext cx="208905" cy="109040"/>
             </a:xfrm>
             <a:prstGeom prst="rect">
               <a:avLst/>
@@ -5315,7 +5315,7 @@
                   <a:latin typeface="Arial"/>
                   <a:cs typeface="Arial"/>
                 </a:rPr>
-                <a:t>8.8%</a:t>
+                <a:t>9%</a:t>
               </a:r>
             </a:p>
           </p:txBody>
@@ -5328,8 +5328,8 @@
           </p:nvSpPr>
           <p:spPr>
             <a:xfrm>
-              <a:off x="5631922" y="3555336"/>
-              <a:ext cx="289291" cy="109040"/>
+              <a:off x="5564141" y="3517933"/>
+              <a:ext cx="409835" cy="109040"/>
             </a:xfrm>
             <a:prstGeom prst="rect">
               <a:avLst/>
@@ -5361,7 +5361,7 @@
                   <a:latin typeface="Arial"/>
                   <a:cs typeface="Arial"/>
                 </a:rPr>
-                <a:t>11%</a:t>
+                <a:t>10.3%</a:t>
               </a:r>
             </a:p>
           </p:txBody>
@@ -5374,8 +5374,8 @@
           </p:nvSpPr>
           <p:spPr>
             <a:xfrm>
-              <a:off x="5354185" y="4379841"/>
-              <a:ext cx="289291" cy="109040"/>
+              <a:off x="5201920" y="4454012"/>
+              <a:ext cx="409835" cy="109040"/>
             </a:xfrm>
             <a:prstGeom prst="rect">
               <a:avLst/>
@@ -5407,7 +5407,7 @@
                   <a:latin typeface="Arial"/>
                   <a:cs typeface="Arial"/>
                 </a:rPr>
-                <a:t>21%</a:t>
+                <a:t>27.2%</a:t>
               </a:r>
             </a:p>
           </p:txBody>
@@ -5420,7 +5420,7 @@
           </p:nvSpPr>
           <p:spPr>
             <a:xfrm>
-              <a:off x="3778282" y="3753041"/>
+              <a:off x="3784000" y="3606029"/>
               <a:ext cx="409835" cy="109040"/>
             </a:xfrm>
             <a:prstGeom prst="rect">
@@ -5453,7 +5453,7 @@
                   <a:latin typeface="Arial"/>
                   <a:cs typeface="Arial"/>
                 </a:rPr>
-                <a:t>51.4%</a:t>
+                <a:t>46.2%</a:t>
               </a:r>
             </a:p>
           </p:txBody>
@@ -5466,7 +5466,7 @@
           </p:nvSpPr>
           <p:spPr>
             <a:xfrm>
-              <a:off x="4938469" y="2836939"/>
+              <a:off x="4924649" y="2833578"/>
               <a:ext cx="329449" cy="109040"/>
             </a:xfrm>
             <a:prstGeom prst="rect">
@@ -5499,7 +5499,7 @@
                   <a:latin typeface="Arial"/>
                   <a:cs typeface="Arial"/>
                 </a:rPr>
-                <a:t>7.8%</a:t>
+                <a:t>7.3%</a:t>
               </a:r>
             </a:p>
           </p:txBody>
@@ -5512,8 +5512,8 @@
           </p:nvSpPr>
           <p:spPr>
             <a:xfrm>
-              <a:off x="5347812" y="3065190"/>
-              <a:ext cx="329449" cy="109040"/>
+              <a:off x="5391132" y="3049144"/>
+              <a:ext cx="208905" cy="109040"/>
             </a:xfrm>
             <a:prstGeom prst="rect">
               <a:avLst/>
@@ -5545,7 +5545,7 @@
                   <a:latin typeface="Arial"/>
                   <a:cs typeface="Arial"/>
                 </a:rPr>
-                <a:t>8.8%</a:t>
+                <a:t>9%</a:t>
               </a:r>
             </a:p>
           </p:txBody>
@@ -5558,8 +5558,8 @@
           </p:nvSpPr>
           <p:spPr>
             <a:xfrm>
-              <a:off x="5627963" y="3554548"/>
-              <a:ext cx="289291" cy="109040"/>
+              <a:off x="5560182" y="3517145"/>
+              <a:ext cx="409835" cy="109040"/>
             </a:xfrm>
             <a:prstGeom prst="rect">
               <a:avLst/>
@@ -5591,7 +5591,7 @@
                   <a:latin typeface="Arial"/>
                   <a:cs typeface="Arial"/>
                 </a:rPr>
-                <a:t>11%</a:t>
+                <a:t>10.3%</a:t>
               </a:r>
             </a:p>
           </p:txBody>
@@ -5604,8 +5604,8 @@
           </p:nvSpPr>
           <p:spPr>
             <a:xfrm>
-              <a:off x="5350226" y="4379054"/>
-              <a:ext cx="289291" cy="109040"/>
+              <a:off x="5197960" y="4453224"/>
+              <a:ext cx="409835" cy="109040"/>
             </a:xfrm>
             <a:prstGeom prst="rect">
               <a:avLst/>
@@ -5637,7 +5637,7 @@
                   <a:latin typeface="Arial"/>
                   <a:cs typeface="Arial"/>
                 </a:rPr>
-                <a:t>21%</a:t>
+                <a:t>27.2%</a:t>
               </a:r>
             </a:p>
           </p:txBody>
@@ -5650,7 +5650,7 @@
           </p:nvSpPr>
           <p:spPr>
             <a:xfrm>
-              <a:off x="3774323" y="3752253"/>
+              <a:off x="3780040" y="3605241"/>
               <a:ext cx="409835" cy="109040"/>
             </a:xfrm>
             <a:prstGeom prst="rect">
@@ -5683,7 +5683,7 @@
                   <a:latin typeface="Arial"/>
                   <a:cs typeface="Arial"/>
                 </a:rPr>
-                <a:t>51.4%</a:t>
+                <a:t>46.2%</a:t>
               </a:r>
             </a:p>
           </p:txBody>
@@ -5696,7 +5696,7 @@
           </p:nvSpPr>
           <p:spPr>
             <a:xfrm>
-              <a:off x="4934509" y="2837727"/>
+              <a:off x="4920690" y="2834365"/>
               <a:ext cx="329449" cy="109040"/>
             </a:xfrm>
             <a:prstGeom prst="rect">
@@ -5729,7 +5729,7 @@
                   <a:latin typeface="Arial"/>
                   <a:cs typeface="Arial"/>
                 </a:rPr>
-                <a:t>7.8%</a:t>
+                <a:t>7.3%</a:t>
               </a:r>
             </a:p>
           </p:txBody>
@@ -5742,8 +5742,8 @@
           </p:nvSpPr>
           <p:spPr>
             <a:xfrm>
-              <a:off x="5343853" y="3065977"/>
-              <a:ext cx="329449" cy="109040"/>
+              <a:off x="5387172" y="3049931"/>
+              <a:ext cx="208905" cy="109040"/>
             </a:xfrm>
             <a:prstGeom prst="rect">
               <a:avLst/>
@@ -5775,7 +5775,7 @@
                   <a:latin typeface="Arial"/>
                   <a:cs typeface="Arial"/>
                 </a:rPr>
-                <a:t>8.8%</a:t>
+                <a:t>9%</a:t>
               </a:r>
             </a:p>
           </p:txBody>
@@ -5788,8 +5788,8 @@
           </p:nvSpPr>
           <p:spPr>
             <a:xfrm>
-              <a:off x="5624003" y="3555336"/>
-              <a:ext cx="289291" cy="109040"/>
+              <a:off x="5556223" y="3517933"/>
+              <a:ext cx="409835" cy="109040"/>
             </a:xfrm>
             <a:prstGeom prst="rect">
               <a:avLst/>
@@ -5821,7 +5821,7 @@
                   <a:latin typeface="Arial"/>
                   <a:cs typeface="Arial"/>
                 </a:rPr>
-                <a:t>11%</a:t>
+                <a:t>10.3%</a:t>
               </a:r>
             </a:p>
           </p:txBody>
@@ -5834,8 +5834,8 @@
           </p:nvSpPr>
           <p:spPr>
             <a:xfrm>
-              <a:off x="5346266" y="4379841"/>
-              <a:ext cx="289291" cy="109040"/>
+              <a:off x="5194001" y="4454012"/>
+              <a:ext cx="409835" cy="109040"/>
             </a:xfrm>
             <a:prstGeom prst="rect">
               <a:avLst/>
@@ -5867,7 +5867,7 @@
                   <a:latin typeface="Arial"/>
                   <a:cs typeface="Arial"/>
                 </a:rPr>
-                <a:t>21%</a:t>
+                <a:t>27.2%</a:t>
               </a:r>
             </a:p>
           </p:txBody>
@@ -5880,7 +5880,7 @@
           </p:nvSpPr>
           <p:spPr>
             <a:xfrm>
-              <a:off x="3770363" y="3753041"/>
+              <a:off x="3776081" y="3606029"/>
               <a:ext cx="409835" cy="109040"/>
             </a:xfrm>
             <a:prstGeom prst="rect">
@@ -5913,7 +5913,7 @@
                   <a:latin typeface="Arial"/>
                   <a:cs typeface="Arial"/>
                 </a:rPr>
-                <a:t>51.4%</a:t>
+                <a:t>46.2%</a:t>
               </a:r>
             </a:p>
           </p:txBody>
@@ -5926,7 +5926,7 @@
           </p:nvSpPr>
           <p:spPr>
             <a:xfrm>
-              <a:off x="4931153" y="2839970"/>
+              <a:off x="4917333" y="2836608"/>
               <a:ext cx="329449" cy="109040"/>
             </a:xfrm>
             <a:prstGeom prst="rect">
@@ -5959,7 +5959,7 @@
                   <a:latin typeface="Arial"/>
                   <a:cs typeface="Arial"/>
                 </a:rPr>
-                <a:t>7.8%</a:t>
+                <a:t>7.3%</a:t>
               </a:r>
             </a:p>
           </p:txBody>
@@ -5972,8 +5972,8 @@
           </p:nvSpPr>
           <p:spPr>
             <a:xfrm>
-              <a:off x="5340496" y="3068220"/>
-              <a:ext cx="329449" cy="109040"/>
+              <a:off x="5383816" y="3052174"/>
+              <a:ext cx="208905" cy="109040"/>
             </a:xfrm>
             <a:prstGeom prst="rect">
               <a:avLst/>
@@ -6005,7 +6005,7 @@
                   <a:latin typeface="Arial"/>
                   <a:cs typeface="Arial"/>
                 </a:rPr>
-                <a:t>8.8%</a:t>
+                <a:t>9%</a:t>
               </a:r>
             </a:p>
           </p:txBody>
@@ -6018,8 +6018,8 @@
           </p:nvSpPr>
           <p:spPr>
             <a:xfrm>
-              <a:off x="5620647" y="3557579"/>
-              <a:ext cx="289291" cy="109040"/>
+              <a:off x="5552866" y="3520175"/>
+              <a:ext cx="409835" cy="109040"/>
             </a:xfrm>
             <a:prstGeom prst="rect">
               <a:avLst/>
@@ -6051,7 +6051,7 @@
                   <a:latin typeface="Arial"/>
                   <a:cs typeface="Arial"/>
                 </a:rPr>
-                <a:t>11%</a:t>
+                <a:t>10.3%</a:t>
               </a:r>
             </a:p>
           </p:txBody>
@@ -6064,8 +6064,8 @@
           </p:nvSpPr>
           <p:spPr>
             <a:xfrm>
-              <a:off x="5342910" y="4382084"/>
-              <a:ext cx="289291" cy="109040"/>
+              <a:off x="5190644" y="4456255"/>
+              <a:ext cx="409835" cy="109040"/>
             </a:xfrm>
             <a:prstGeom prst="rect">
               <a:avLst/>
@@ -6097,7 +6097,7 @@
                   <a:latin typeface="Arial"/>
                   <a:cs typeface="Arial"/>
                 </a:rPr>
-                <a:t>21%</a:t>
+                <a:t>27.2%</a:t>
               </a:r>
             </a:p>
           </p:txBody>
@@ -6110,7 +6110,7 @@
           </p:nvSpPr>
           <p:spPr>
             <a:xfrm>
-              <a:off x="3767007" y="3755284"/>
+              <a:off x="3772724" y="3608272"/>
               <a:ext cx="409835" cy="109040"/>
             </a:xfrm>
             <a:prstGeom prst="rect">
@@ -6143,7 +6143,7 @@
                   <a:latin typeface="Arial"/>
                   <a:cs typeface="Arial"/>
                 </a:rPr>
-                <a:t>51.4%</a:t>
+                <a:t>46.2%</a:t>
               </a:r>
             </a:p>
           </p:txBody>
@@ -6156,7 +6156,7 @@
           </p:nvSpPr>
           <p:spPr>
             <a:xfrm>
-              <a:off x="4928910" y="2843326"/>
+              <a:off x="4915090" y="2839965"/>
               <a:ext cx="329449" cy="109040"/>
             </a:xfrm>
             <a:prstGeom prst="rect">
@@ -6189,7 +6189,7 @@
                   <a:latin typeface="Arial"/>
                   <a:cs typeface="Arial"/>
                 </a:rPr>
-                <a:t>7.8%</a:t>
+                <a:t>7.3%</a:t>
               </a:r>
             </a:p>
           </p:txBody>
@@ -6202,8 +6202,8 @@
           </p:nvSpPr>
           <p:spPr>
             <a:xfrm>
-              <a:off x="5338253" y="3071577"/>
-              <a:ext cx="329449" cy="109040"/>
+              <a:off x="5381573" y="3055531"/>
+              <a:ext cx="208905" cy="109040"/>
             </a:xfrm>
             <a:prstGeom prst="rect">
               <a:avLst/>
@@ -6235,7 +6235,7 @@
                   <a:latin typeface="Arial"/>
                   <a:cs typeface="Arial"/>
                 </a:rPr>
-                <a:t>8.8%</a:t>
+                <a:t>9%</a:t>
               </a:r>
             </a:p>
           </p:txBody>
@@ -6248,8 +6248,8 @@
           </p:nvSpPr>
           <p:spPr>
             <a:xfrm>
-              <a:off x="5618404" y="3560935"/>
-              <a:ext cx="289291" cy="109040"/>
+              <a:off x="5550623" y="3523532"/>
+              <a:ext cx="409835" cy="109040"/>
             </a:xfrm>
             <a:prstGeom prst="rect">
               <a:avLst/>
@@ -6281,7 +6281,7 @@
                   <a:latin typeface="Arial"/>
                   <a:cs typeface="Arial"/>
                 </a:rPr>
-                <a:t>11%</a:t>
+                <a:t>10.3%</a:t>
               </a:r>
             </a:p>
           </p:txBody>
@@ -6294,8 +6294,8 @@
           </p:nvSpPr>
           <p:spPr>
             <a:xfrm>
-              <a:off x="5340667" y="4385441"/>
-              <a:ext cx="289291" cy="109040"/>
+              <a:off x="5188401" y="4459612"/>
+              <a:ext cx="409835" cy="109040"/>
             </a:xfrm>
             <a:prstGeom prst="rect">
               <a:avLst/>
@@ -6327,7 +6327,7 @@
                   <a:latin typeface="Arial"/>
                   <a:cs typeface="Arial"/>
                 </a:rPr>
-                <a:t>21%</a:t>
+                <a:t>27.2%</a:t>
               </a:r>
             </a:p>
           </p:txBody>
@@ -6340,7 +6340,7 @@
           </p:nvSpPr>
           <p:spPr>
             <a:xfrm>
-              <a:off x="3764764" y="3758640"/>
+              <a:off x="3770482" y="3611628"/>
               <a:ext cx="409835" cy="109040"/>
             </a:xfrm>
             <a:prstGeom prst="rect">
@@ -6373,7 +6373,7 @@
                   <a:latin typeface="Arial"/>
                   <a:cs typeface="Arial"/>
                 </a:rPr>
-                <a:t>51.4%</a:t>
+                <a:t>46.2%</a:t>
               </a:r>
             </a:p>
           </p:txBody>
@@ -6386,7 +6386,7 @@
           </p:nvSpPr>
           <p:spPr>
             <a:xfrm>
-              <a:off x="4928122" y="2847286"/>
+              <a:off x="4914303" y="2843924"/>
               <a:ext cx="329449" cy="109040"/>
             </a:xfrm>
             <a:prstGeom prst="rect">
@@ -6419,7 +6419,7 @@
                   <a:latin typeface="Arial"/>
                   <a:cs typeface="Arial"/>
                 </a:rPr>
-                <a:t>7.8%</a:t>
+                <a:t>7.3%</a:t>
               </a:r>
             </a:p>
           </p:txBody>
@@ -6432,8 +6432,8 @@
           </p:nvSpPr>
           <p:spPr>
             <a:xfrm>
-              <a:off x="5337466" y="3075536"/>
-              <a:ext cx="329449" cy="109040"/>
+              <a:off x="5380785" y="3059490"/>
+              <a:ext cx="208905" cy="109040"/>
             </a:xfrm>
             <a:prstGeom prst="rect">
               <a:avLst/>
@@ -6465,7 +6465,7 @@
                   <a:latin typeface="Arial"/>
                   <a:cs typeface="Arial"/>
                 </a:rPr>
-                <a:t>8.8%</a:t>
+                <a:t>9%</a:t>
               </a:r>
             </a:p>
           </p:txBody>
@@ -6478,8 +6478,8 @@
           </p:nvSpPr>
           <p:spPr>
             <a:xfrm>
-              <a:off x="5617616" y="3564895"/>
-              <a:ext cx="289291" cy="109040"/>
+              <a:off x="5549835" y="3527491"/>
+              <a:ext cx="409835" cy="109040"/>
             </a:xfrm>
             <a:prstGeom prst="rect">
               <a:avLst/>
@@ -6511,7 +6511,7 @@
                   <a:latin typeface="Arial"/>
                   <a:cs typeface="Arial"/>
                 </a:rPr>
-                <a:t>11%</a:t>
+                <a:t>10.3%</a:t>
               </a:r>
             </a:p>
           </p:txBody>
@@ -6524,8 +6524,8 @@
           </p:nvSpPr>
           <p:spPr>
             <a:xfrm>
-              <a:off x="5339879" y="4389400"/>
-              <a:ext cx="289291" cy="109040"/>
+              <a:off x="5187614" y="4463571"/>
+              <a:ext cx="409835" cy="109040"/>
             </a:xfrm>
             <a:prstGeom prst="rect">
               <a:avLst/>
@@ -6557,7 +6557,7 @@
                   <a:latin typeface="Arial"/>
                   <a:cs typeface="Arial"/>
                 </a:rPr>
-                <a:t>21%</a:t>
+                <a:t>27.2%</a:t>
               </a:r>
             </a:p>
           </p:txBody>
@@ -6570,7 +6570,7 @@
           </p:nvSpPr>
           <p:spPr>
             <a:xfrm>
-              <a:off x="3763976" y="3762600"/>
+              <a:off x="3769694" y="3615588"/>
               <a:ext cx="409835" cy="109040"/>
             </a:xfrm>
             <a:prstGeom prst="rect">
@@ -6603,7 +6603,7 @@
                   <a:latin typeface="Arial"/>
                   <a:cs typeface="Arial"/>
                 </a:rPr>
-                <a:t>51.4%</a:t>
+                <a:t>46.2%</a:t>
               </a:r>
             </a:p>
           </p:txBody>
@@ -6616,7 +6616,7 @@
           </p:nvSpPr>
           <p:spPr>
             <a:xfrm>
-              <a:off x="4928910" y="2851245"/>
+              <a:off x="4915090" y="2847883"/>
               <a:ext cx="329449" cy="109040"/>
             </a:xfrm>
             <a:prstGeom prst="rect">
@@ -6649,7 +6649,7 @@
                   <a:latin typeface="Arial"/>
                   <a:cs typeface="Arial"/>
                 </a:rPr>
-                <a:t>7.8%</a:t>
+                <a:t>7.3%</a:t>
               </a:r>
             </a:p>
           </p:txBody>
@@ -6662,8 +6662,8 @@
           </p:nvSpPr>
           <p:spPr>
             <a:xfrm>
-              <a:off x="5338253" y="3079495"/>
-              <a:ext cx="329449" cy="109040"/>
+              <a:off x="5381573" y="3063450"/>
+              <a:ext cx="208905" cy="109040"/>
             </a:xfrm>
             <a:prstGeom prst="rect">
               <a:avLst/>
@@ -6695,7 +6695,7 @@
                   <a:latin typeface="Arial"/>
                   <a:cs typeface="Arial"/>
                 </a:rPr>
-                <a:t>8.8%</a:t>
+                <a:t>9%</a:t>
               </a:r>
             </a:p>
           </p:txBody>
@@ -6708,8 +6708,8 @@
           </p:nvSpPr>
           <p:spPr>
             <a:xfrm>
-              <a:off x="5618404" y="3568854"/>
-              <a:ext cx="289291" cy="109040"/>
+              <a:off x="5550623" y="3531451"/>
+              <a:ext cx="409835" cy="109040"/>
             </a:xfrm>
             <a:prstGeom prst="rect">
               <a:avLst/>
@@ -6741,7 +6741,7 @@
                   <a:latin typeface="Arial"/>
                   <a:cs typeface="Arial"/>
                 </a:rPr>
-                <a:t>11%</a:t>
+                <a:t>10.3%</a:t>
               </a:r>
             </a:p>
           </p:txBody>
@@ -6754,8 +6754,8 @@
           </p:nvSpPr>
           <p:spPr>
             <a:xfrm>
-              <a:off x="5340667" y="4393359"/>
-              <a:ext cx="289291" cy="109040"/>
+              <a:off x="5188401" y="4467530"/>
+              <a:ext cx="409835" cy="109040"/>
             </a:xfrm>
             <a:prstGeom prst="rect">
               <a:avLst/>
@@ -6787,7 +6787,7 @@
                   <a:latin typeface="Arial"/>
                   <a:cs typeface="Arial"/>
                 </a:rPr>
-                <a:t>21%</a:t>
+                <a:t>27.2%</a:t>
               </a:r>
             </a:p>
           </p:txBody>
@@ -6800,7 +6800,7 @@
           </p:nvSpPr>
           <p:spPr>
             <a:xfrm>
-              <a:off x="3764764" y="3766559"/>
+              <a:off x="3770482" y="3619547"/>
               <a:ext cx="409835" cy="109040"/>
             </a:xfrm>
             <a:prstGeom prst="rect">
@@ -6833,7 +6833,7 @@
                   <a:latin typeface="Arial"/>
                   <a:cs typeface="Arial"/>
                 </a:rPr>
-                <a:t>51.4%</a:t>
+                <a:t>46.2%</a:t>
               </a:r>
             </a:p>
           </p:txBody>
@@ -6846,7 +6846,7 @@
           </p:nvSpPr>
           <p:spPr>
             <a:xfrm>
-              <a:off x="4931153" y="2854602"/>
+              <a:off x="4917333" y="2851240"/>
               <a:ext cx="329449" cy="109040"/>
             </a:xfrm>
             <a:prstGeom prst="rect">
@@ -6879,7 +6879,7 @@
                   <a:latin typeface="Arial"/>
                   <a:cs typeface="Arial"/>
                 </a:rPr>
-                <a:t>7.8%</a:t>
+                <a:t>7.3%</a:t>
               </a:r>
             </a:p>
           </p:txBody>
@@ -6892,8 +6892,8 @@
           </p:nvSpPr>
           <p:spPr>
             <a:xfrm>
-              <a:off x="5340496" y="3082852"/>
-              <a:ext cx="329449" cy="109040"/>
+              <a:off x="5383816" y="3066806"/>
+              <a:ext cx="208905" cy="109040"/>
             </a:xfrm>
             <a:prstGeom prst="rect">
               <a:avLst/>
@@ -6925,7 +6925,7 @@
                   <a:latin typeface="Arial"/>
                   <a:cs typeface="Arial"/>
                 </a:rPr>
-                <a:t>8.8%</a:t>
+                <a:t>9%</a:t>
               </a:r>
             </a:p>
           </p:txBody>
@@ -6938,8 +6938,8 @@
           </p:nvSpPr>
           <p:spPr>
             <a:xfrm>
-              <a:off x="5620647" y="3572211"/>
-              <a:ext cx="289291" cy="109040"/>
+              <a:off x="5552866" y="3534807"/>
+              <a:ext cx="409835" cy="109040"/>
             </a:xfrm>
             <a:prstGeom prst="rect">
               <a:avLst/>
@@ -6971,7 +6971,7 @@
                   <a:latin typeface="Arial"/>
                   <a:cs typeface="Arial"/>
                 </a:rPr>
-                <a:t>11%</a:t>
+                <a:t>10.3%</a:t>
               </a:r>
             </a:p>
           </p:txBody>
@@ -6984,8 +6984,8 @@
           </p:nvSpPr>
           <p:spPr>
             <a:xfrm>
-              <a:off x="5342910" y="4396716"/>
-              <a:ext cx="289291" cy="109040"/>
+              <a:off x="5190644" y="4470887"/>
+              <a:ext cx="409835" cy="109040"/>
             </a:xfrm>
             <a:prstGeom prst="rect">
               <a:avLst/>
@@ -7017,7 +7017,7 @@
                   <a:latin typeface="Arial"/>
                   <a:cs typeface="Arial"/>
                 </a:rPr>
-                <a:t>21%</a:t>
+                <a:t>27.2%</a:t>
               </a:r>
             </a:p>
           </p:txBody>
@@ -7030,7 +7030,7 @@
           </p:nvSpPr>
           <p:spPr>
             <a:xfrm>
-              <a:off x="3767007" y="3769916"/>
+              <a:off x="3772724" y="3622904"/>
               <a:ext cx="409835" cy="109040"/>
             </a:xfrm>
             <a:prstGeom prst="rect">
@@ -7063,7 +7063,7 @@
                   <a:latin typeface="Arial"/>
                   <a:cs typeface="Arial"/>
                 </a:rPr>
-                <a:t>51.4%</a:t>
+                <a:t>46.2%</a:t>
               </a:r>
             </a:p>
           </p:txBody>
@@ -7076,7 +7076,7 @@
           </p:nvSpPr>
           <p:spPr>
             <a:xfrm>
-              <a:off x="4934509" y="2856845"/>
+              <a:off x="4920690" y="2853483"/>
               <a:ext cx="329449" cy="109040"/>
             </a:xfrm>
             <a:prstGeom prst="rect">
@@ -7109,7 +7109,7 @@
                   <a:latin typeface="Arial"/>
                   <a:cs typeface="Arial"/>
                 </a:rPr>
-                <a:t>7.8%</a:t>
+                <a:t>7.3%</a:t>
               </a:r>
             </a:p>
           </p:txBody>
@@ -7122,8 +7122,8 @@
           </p:nvSpPr>
           <p:spPr>
             <a:xfrm>
-              <a:off x="5343853" y="3085095"/>
-              <a:ext cx="329449" cy="109040"/>
+              <a:off x="5387172" y="3069049"/>
+              <a:ext cx="208905" cy="109040"/>
             </a:xfrm>
             <a:prstGeom prst="rect">
               <a:avLst/>
@@ -7155,7 +7155,7 @@
                   <a:latin typeface="Arial"/>
                   <a:cs typeface="Arial"/>
                 </a:rPr>
-                <a:t>8.8%</a:t>
+                <a:t>9%</a:t>
               </a:r>
             </a:p>
           </p:txBody>
@@ -7168,8 +7168,8 @@
           </p:nvSpPr>
           <p:spPr>
             <a:xfrm>
-              <a:off x="5624003" y="3574454"/>
-              <a:ext cx="289291" cy="109040"/>
+              <a:off x="5556223" y="3537050"/>
+              <a:ext cx="409835" cy="109040"/>
             </a:xfrm>
             <a:prstGeom prst="rect">
               <a:avLst/>
@@ -7201,7 +7201,7 @@
                   <a:latin typeface="Arial"/>
                   <a:cs typeface="Arial"/>
                 </a:rPr>
-                <a:t>11%</a:t>
+                <a:t>10.3%</a:t>
               </a:r>
             </a:p>
           </p:txBody>
@@ -7214,8 +7214,8 @@
           </p:nvSpPr>
           <p:spPr>
             <a:xfrm>
-              <a:off x="5346266" y="4398959"/>
-              <a:ext cx="289291" cy="109040"/>
+              <a:off x="5194001" y="4473130"/>
+              <a:ext cx="409835" cy="109040"/>
             </a:xfrm>
             <a:prstGeom prst="rect">
               <a:avLst/>
@@ -7247,7 +7247,7 @@
                   <a:latin typeface="Arial"/>
                   <a:cs typeface="Arial"/>
                 </a:rPr>
-                <a:t>21%</a:t>
+                <a:t>27.2%</a:t>
               </a:r>
             </a:p>
           </p:txBody>
@@ -7260,7 +7260,7 @@
           </p:nvSpPr>
           <p:spPr>
             <a:xfrm>
-              <a:off x="3770363" y="3772159"/>
+              <a:off x="3776081" y="3625146"/>
               <a:ext cx="409835" cy="109040"/>
             </a:xfrm>
             <a:prstGeom prst="rect">
@@ -7293,7 +7293,7 @@
                   <a:latin typeface="Arial"/>
                   <a:cs typeface="Arial"/>
                 </a:rPr>
-                <a:t>51.4%</a:t>
+                <a:t>46.2%</a:t>
               </a:r>
             </a:p>
           </p:txBody>
@@ -7306,7 +7306,7 @@
           </p:nvSpPr>
           <p:spPr>
             <a:xfrm>
-              <a:off x="4938469" y="2857632"/>
+              <a:off x="4924649" y="2854270"/>
               <a:ext cx="329449" cy="109040"/>
             </a:xfrm>
             <a:prstGeom prst="rect">
@@ -7339,7 +7339,7 @@
                   <a:latin typeface="Arial"/>
                   <a:cs typeface="Arial"/>
                 </a:rPr>
-                <a:t>7.8%</a:t>
+                <a:t>7.3%</a:t>
               </a:r>
             </a:p>
           </p:txBody>
@@ -7352,8 +7352,8 @@
           </p:nvSpPr>
           <p:spPr>
             <a:xfrm>
-              <a:off x="5347812" y="3085882"/>
-              <a:ext cx="329449" cy="109040"/>
+              <a:off x="5391132" y="3069837"/>
+              <a:ext cx="208905" cy="109040"/>
             </a:xfrm>
             <a:prstGeom prst="rect">
               <a:avLst/>
@@ -7385,7 +7385,7 @@
                   <a:latin typeface="Arial"/>
                   <a:cs typeface="Arial"/>
                 </a:rPr>
-                <a:t>8.8%</a:t>
+                <a:t>9%</a:t>
               </a:r>
             </a:p>
           </p:txBody>
@@ -7398,8 +7398,8 @@
           </p:nvSpPr>
           <p:spPr>
             <a:xfrm>
-              <a:off x="5627963" y="3575241"/>
-              <a:ext cx="289291" cy="109040"/>
+              <a:off x="5560182" y="3537838"/>
+              <a:ext cx="409835" cy="109040"/>
             </a:xfrm>
             <a:prstGeom prst="rect">
               <a:avLst/>
@@ -7431,7 +7431,7 @@
                   <a:latin typeface="Arial"/>
                   <a:cs typeface="Arial"/>
                 </a:rPr>
-                <a:t>11%</a:t>
+                <a:t>10.3%</a:t>
               </a:r>
             </a:p>
           </p:txBody>
@@ -7444,8 +7444,8 @@
           </p:nvSpPr>
           <p:spPr>
             <a:xfrm>
-              <a:off x="5350226" y="4399747"/>
-              <a:ext cx="289291" cy="109040"/>
+              <a:off x="5197960" y="4473917"/>
+              <a:ext cx="409835" cy="109040"/>
             </a:xfrm>
             <a:prstGeom prst="rect">
               <a:avLst/>
@@ -7477,7 +7477,7 @@
                   <a:latin typeface="Arial"/>
                   <a:cs typeface="Arial"/>
                 </a:rPr>
-                <a:t>21%</a:t>
+                <a:t>27.2%</a:t>
               </a:r>
             </a:p>
           </p:txBody>
@@ -7490,7 +7490,7 @@
           </p:nvSpPr>
           <p:spPr>
             <a:xfrm>
-              <a:off x="3774323" y="3772946"/>
+              <a:off x="3780040" y="3625934"/>
               <a:ext cx="409835" cy="109040"/>
             </a:xfrm>
             <a:prstGeom prst="rect">
@@ -7523,7 +7523,7 @@
                   <a:latin typeface="Arial"/>
                   <a:cs typeface="Arial"/>
                 </a:rPr>
-                <a:t>51.4%</a:t>
+                <a:t>46.2%</a:t>
               </a:r>
             </a:p>
           </p:txBody>
@@ -7536,7 +7536,7 @@
           </p:nvSpPr>
           <p:spPr>
             <a:xfrm>
-              <a:off x="4942428" y="2856845"/>
+              <a:off x="4928609" y="2853483"/>
               <a:ext cx="329449" cy="109040"/>
             </a:xfrm>
             <a:prstGeom prst="rect">
@@ -7569,7 +7569,7 @@
                   <a:latin typeface="Arial"/>
                   <a:cs typeface="Arial"/>
                 </a:rPr>
-                <a:t>7.8%</a:t>
+                <a:t>7.3%</a:t>
               </a:r>
             </a:p>
           </p:txBody>
@@ -7582,8 +7582,8 @@
           </p:nvSpPr>
           <p:spPr>
             <a:xfrm>
-              <a:off x="5351772" y="3085095"/>
-              <a:ext cx="329449" cy="109040"/>
+              <a:off x="5395091" y="3069049"/>
+              <a:ext cx="208905" cy="109040"/>
             </a:xfrm>
             <a:prstGeom prst="rect">
               <a:avLst/>
@@ -7615,7 +7615,7 @@
                   <a:latin typeface="Arial"/>
                   <a:cs typeface="Arial"/>
                 </a:rPr>
-                <a:t>8.8%</a:t>
+                <a:t>9%</a:t>
               </a:r>
             </a:p>
           </p:txBody>
@@ -7628,8 +7628,8 @@
           </p:nvSpPr>
           <p:spPr>
             <a:xfrm>
-              <a:off x="5631922" y="3574454"/>
-              <a:ext cx="289291" cy="109040"/>
+              <a:off x="5564141" y="3537050"/>
+              <a:ext cx="409835" cy="109040"/>
             </a:xfrm>
             <a:prstGeom prst="rect">
               <a:avLst/>
@@ -7661,7 +7661,7 @@
                   <a:latin typeface="Arial"/>
                   <a:cs typeface="Arial"/>
                 </a:rPr>
-                <a:t>11%</a:t>
+                <a:t>10.3%</a:t>
               </a:r>
             </a:p>
           </p:txBody>
@@ -7674,8 +7674,8 @@
           </p:nvSpPr>
           <p:spPr>
             <a:xfrm>
-              <a:off x="5354185" y="4398959"/>
-              <a:ext cx="289291" cy="109040"/>
+              <a:off x="5201920" y="4473130"/>
+              <a:ext cx="409835" cy="109040"/>
             </a:xfrm>
             <a:prstGeom prst="rect">
               <a:avLst/>
@@ -7707,7 +7707,7 @@
                   <a:latin typeface="Arial"/>
                   <a:cs typeface="Arial"/>
                 </a:rPr>
-                <a:t>21%</a:t>
+                <a:t>27.2%</a:t>
               </a:r>
             </a:p>
           </p:txBody>
@@ -7720,7 +7720,7 @@
           </p:nvSpPr>
           <p:spPr>
             <a:xfrm>
-              <a:off x="3778282" y="3772159"/>
+              <a:off x="3784000" y="3625146"/>
               <a:ext cx="409835" cy="109040"/>
             </a:xfrm>
             <a:prstGeom prst="rect">
@@ -7753,7 +7753,7 @@
                   <a:latin typeface="Arial"/>
                   <a:cs typeface="Arial"/>
                 </a:rPr>
-                <a:t>51.4%</a:t>
+                <a:t>46.2%</a:t>
               </a:r>
             </a:p>
           </p:txBody>
@@ -7766,7 +7766,7 @@
           </p:nvSpPr>
           <p:spPr>
             <a:xfrm>
-              <a:off x="4945785" y="2854602"/>
+              <a:off x="4931965" y="2851240"/>
               <a:ext cx="329449" cy="109040"/>
             </a:xfrm>
             <a:prstGeom prst="rect">
@@ -7799,7 +7799,7 @@
                   <a:latin typeface="Arial"/>
                   <a:cs typeface="Arial"/>
                 </a:rPr>
-                <a:t>7.8%</a:t>
+                <a:t>7.3%</a:t>
               </a:r>
             </a:p>
           </p:txBody>
@@ -7812,8 +7812,8 @@
           </p:nvSpPr>
           <p:spPr>
             <a:xfrm>
-              <a:off x="5355128" y="3082852"/>
-              <a:ext cx="329449" cy="109040"/>
+              <a:off x="5398448" y="3066806"/>
+              <a:ext cx="208905" cy="109040"/>
             </a:xfrm>
             <a:prstGeom prst="rect">
               <a:avLst/>
@@ -7845,7 +7845,7 @@
                   <a:latin typeface="Arial"/>
                   <a:cs typeface="Arial"/>
                 </a:rPr>
-                <a:t>8.8%</a:t>
+                <a:t>9%</a:t>
               </a:r>
             </a:p>
           </p:txBody>
@@ -7858,8 +7858,8 @@
           </p:nvSpPr>
           <p:spPr>
             <a:xfrm>
-              <a:off x="5635279" y="3572211"/>
-              <a:ext cx="289291" cy="109040"/>
+              <a:off x="5567498" y="3534807"/>
+              <a:ext cx="409835" cy="109040"/>
             </a:xfrm>
             <a:prstGeom prst="rect">
               <a:avLst/>
@@ -7891,7 +7891,7 @@
                   <a:latin typeface="Arial"/>
                   <a:cs typeface="Arial"/>
                 </a:rPr>
-                <a:t>11%</a:t>
+                <a:t>10.3%</a:t>
               </a:r>
             </a:p>
           </p:txBody>
@@ -7904,8 +7904,8 @@
           </p:nvSpPr>
           <p:spPr>
             <a:xfrm>
-              <a:off x="5357542" y="4396716"/>
-              <a:ext cx="289291" cy="109040"/>
+              <a:off x="5205276" y="4470887"/>
+              <a:ext cx="409835" cy="109040"/>
             </a:xfrm>
             <a:prstGeom prst="rect">
               <a:avLst/>
@@ -7937,7 +7937,7 @@
                   <a:latin typeface="Arial"/>
                   <a:cs typeface="Arial"/>
                 </a:rPr>
-                <a:t>21%</a:t>
+                <a:t>27.2%</a:t>
               </a:r>
             </a:p>
           </p:txBody>
@@ -7950,7 +7950,7 @@
           </p:nvSpPr>
           <p:spPr>
             <a:xfrm>
-              <a:off x="3781639" y="3769916"/>
+              <a:off x="3787356" y="3622904"/>
               <a:ext cx="409835" cy="109040"/>
             </a:xfrm>
             <a:prstGeom prst="rect">
@@ -7983,7 +7983,7 @@
                   <a:latin typeface="Arial"/>
                   <a:cs typeface="Arial"/>
                 </a:rPr>
-                <a:t>51.4%</a:t>
+                <a:t>46.2%</a:t>
               </a:r>
             </a:p>
           </p:txBody>
@@ -7996,7 +7996,7 @@
           </p:nvSpPr>
           <p:spPr>
             <a:xfrm>
-              <a:off x="4948028" y="2851245"/>
+              <a:off x="4934208" y="2847883"/>
               <a:ext cx="329449" cy="109040"/>
             </a:xfrm>
             <a:prstGeom prst="rect">
@@ -8029,7 +8029,7 @@
                   <a:latin typeface="Arial"/>
                   <a:cs typeface="Arial"/>
                 </a:rPr>
-                <a:t>7.8%</a:t>
+                <a:t>7.3%</a:t>
               </a:r>
             </a:p>
           </p:txBody>
@@ -8042,8 +8042,8 @@
           </p:nvSpPr>
           <p:spPr>
             <a:xfrm>
-              <a:off x="5357371" y="3079495"/>
-              <a:ext cx="329449" cy="109040"/>
+              <a:off x="5400691" y="3063450"/>
+              <a:ext cx="208905" cy="109040"/>
             </a:xfrm>
             <a:prstGeom prst="rect">
               <a:avLst/>
@@ -8075,7 +8075,7 @@
                   <a:latin typeface="Arial"/>
                   <a:cs typeface="Arial"/>
                 </a:rPr>
-                <a:t>8.8%</a:t>
+                <a:t>9%</a:t>
               </a:r>
             </a:p>
           </p:txBody>
@@ -8088,8 +8088,8 @@
           </p:nvSpPr>
           <p:spPr>
             <a:xfrm>
-              <a:off x="5637522" y="3568854"/>
-              <a:ext cx="289291" cy="109040"/>
+              <a:off x="5569741" y="3531451"/>
+              <a:ext cx="409835" cy="109040"/>
             </a:xfrm>
             <a:prstGeom prst="rect">
               <a:avLst/>
@@ -8121,7 +8121,7 @@
                   <a:latin typeface="Arial"/>
                   <a:cs typeface="Arial"/>
                 </a:rPr>
-                <a:t>11%</a:t>
+                <a:t>10.3%</a:t>
               </a:r>
             </a:p>
           </p:txBody>
@@ -8134,8 +8134,8 @@
           </p:nvSpPr>
           <p:spPr>
             <a:xfrm>
-              <a:off x="5359784" y="4393359"/>
-              <a:ext cx="289291" cy="109040"/>
+              <a:off x="5207519" y="4467530"/>
+              <a:ext cx="409835" cy="109040"/>
             </a:xfrm>
             <a:prstGeom prst="rect">
               <a:avLst/>
@@ -8167,7 +8167,7 @@
                   <a:latin typeface="Arial"/>
                   <a:cs typeface="Arial"/>
                 </a:rPr>
-                <a:t>21%</a:t>
+                <a:t>27.2%</a:t>
               </a:r>
             </a:p>
           </p:txBody>
@@ -8180,7 +8180,7 @@
           </p:nvSpPr>
           <p:spPr>
             <a:xfrm>
-              <a:off x="3783881" y="3766559"/>
+              <a:off x="3789599" y="3619547"/>
               <a:ext cx="409835" cy="109040"/>
             </a:xfrm>
             <a:prstGeom prst="rect">
@@ -8213,7 +8213,7 @@
                   <a:latin typeface="Arial"/>
                   <a:cs typeface="Arial"/>
                 </a:rPr>
-                <a:t>51.4%</a:t>
+                <a:t>46.2%</a:t>
               </a:r>
             </a:p>
           </p:txBody>
@@ -8226,7 +8226,7 @@
           </p:nvSpPr>
           <p:spPr>
             <a:xfrm>
-              <a:off x="4948815" y="2847286"/>
+              <a:off x="4934996" y="2843924"/>
               <a:ext cx="329449" cy="109040"/>
             </a:xfrm>
             <a:prstGeom prst="rect">
@@ -8259,7 +8259,7 @@
                   <a:latin typeface="Arial"/>
                   <a:cs typeface="Arial"/>
                 </a:rPr>
-                <a:t>7.8%</a:t>
+                <a:t>7.3%</a:t>
               </a:r>
             </a:p>
           </p:txBody>
@@ -8272,8 +8272,8 @@
           </p:nvSpPr>
           <p:spPr>
             <a:xfrm>
-              <a:off x="5358159" y="3075536"/>
-              <a:ext cx="329449" cy="109040"/>
+              <a:off x="5401478" y="3059490"/>
+              <a:ext cx="208905" cy="109040"/>
             </a:xfrm>
             <a:prstGeom prst="rect">
               <a:avLst/>
@@ -8305,7 +8305,7 @@
                   <a:latin typeface="Arial"/>
                   <a:cs typeface="Arial"/>
                 </a:rPr>
-                <a:t>8.8%</a:t>
+                <a:t>9%</a:t>
               </a:r>
             </a:p>
           </p:txBody>
@@ -8318,8 +8318,8 @@
           </p:nvSpPr>
           <p:spPr>
             <a:xfrm>
-              <a:off x="5638309" y="3564895"/>
-              <a:ext cx="289291" cy="109040"/>
+              <a:off x="5570528" y="3527491"/>
+              <a:ext cx="409835" cy="109040"/>
             </a:xfrm>
             <a:prstGeom prst="rect">
               <a:avLst/>
@@ -8351,7 +8351,7 @@
                   <a:latin typeface="Arial"/>
                   <a:cs typeface="Arial"/>
                 </a:rPr>
-                <a:t>11%</a:t>
+                <a:t>10.3%</a:t>
               </a:r>
             </a:p>
           </p:txBody>
@@ -8364,8 +8364,8 @@
           </p:nvSpPr>
           <p:spPr>
             <a:xfrm>
-              <a:off x="5360572" y="4389400"/>
-              <a:ext cx="289291" cy="109040"/>
+              <a:off x="5208307" y="4463571"/>
+              <a:ext cx="409835" cy="109040"/>
             </a:xfrm>
             <a:prstGeom prst="rect">
               <a:avLst/>
@@ -8397,7 +8397,7 @@
                   <a:latin typeface="Arial"/>
                   <a:cs typeface="Arial"/>
                 </a:rPr>
-                <a:t>21%</a:t>
+                <a:t>27.2%</a:t>
               </a:r>
             </a:p>
           </p:txBody>
@@ -8410,7 +8410,7 @@
           </p:nvSpPr>
           <p:spPr>
             <a:xfrm>
-              <a:off x="3784669" y="3762600"/>
+              <a:off x="3790387" y="3615588"/>
               <a:ext cx="409835" cy="109040"/>
             </a:xfrm>
             <a:prstGeom prst="rect">
@@ -8443,7 +8443,7 @@
                   <a:latin typeface="Arial"/>
                   <a:cs typeface="Arial"/>
                 </a:rPr>
-                <a:t>51.4%</a:t>
+                <a:t>46.2%</a:t>
               </a:r>
             </a:p>
           </p:txBody>
@@ -8456,7 +8456,7 @@
           </p:nvSpPr>
           <p:spPr>
             <a:xfrm>
-              <a:off x="4938469" y="2847286"/>
+              <a:off x="4924649" y="2843924"/>
               <a:ext cx="329449" cy="109040"/>
             </a:xfrm>
             <a:prstGeom prst="rect">
@@ -8489,7 +8489,7 @@
                   <a:latin typeface="Arial"/>
                   <a:cs typeface="Arial"/>
                 </a:rPr>
-                <a:t>7.8%</a:t>
+                <a:t>7.3%</a:t>
               </a:r>
             </a:p>
           </p:txBody>
@@ -8502,8 +8502,8 @@
           </p:nvSpPr>
           <p:spPr>
             <a:xfrm>
-              <a:off x="5347812" y="3075536"/>
-              <a:ext cx="329449" cy="109040"/>
+              <a:off x="5391132" y="3059490"/>
+              <a:ext cx="208905" cy="109040"/>
             </a:xfrm>
             <a:prstGeom prst="rect">
               <a:avLst/>
@@ -8535,7 +8535,7 @@
                   <a:latin typeface="Arial"/>
                   <a:cs typeface="Arial"/>
                 </a:rPr>
-                <a:t>8.8%</a:t>
+                <a:t>9%</a:t>
               </a:r>
             </a:p>
           </p:txBody>
@@ -8548,8 +8548,8 @@
           </p:nvSpPr>
           <p:spPr>
             <a:xfrm>
-              <a:off x="5627963" y="3564895"/>
-              <a:ext cx="289291" cy="109040"/>
+              <a:off x="5560182" y="3527491"/>
+              <a:ext cx="409835" cy="109040"/>
             </a:xfrm>
             <a:prstGeom prst="rect">
               <a:avLst/>
@@ -8581,7 +8581,7 @@
                   <a:latin typeface="Arial"/>
                   <a:cs typeface="Arial"/>
                 </a:rPr>
-                <a:t>11%</a:t>
+                <a:t>10.3%</a:t>
               </a:r>
             </a:p>
           </p:txBody>
@@ -8594,8 +8594,8 @@
           </p:nvSpPr>
           <p:spPr>
             <a:xfrm>
-              <a:off x="5350226" y="4389400"/>
-              <a:ext cx="289291" cy="109040"/>
+              <a:off x="5197960" y="4463571"/>
+              <a:ext cx="409835" cy="109040"/>
             </a:xfrm>
             <a:prstGeom prst="rect">
               <a:avLst/>
@@ -8627,7 +8627,7 @@
                   <a:latin typeface="Arial"/>
                   <a:cs typeface="Arial"/>
                 </a:rPr>
-                <a:t>21%</a:t>
+                <a:t>27.2%</a:t>
               </a:r>
             </a:p>
           </p:txBody>
@@ -8640,7 +8640,7 @@
           </p:nvSpPr>
           <p:spPr>
             <a:xfrm>
-              <a:off x="3774323" y="3762600"/>
+              <a:off x="3780040" y="3615588"/>
               <a:ext cx="409835" cy="109040"/>
             </a:xfrm>
             <a:prstGeom prst="rect">
@@ -8673,7 +8673,7 @@
                   <a:latin typeface="Arial"/>
                   <a:cs typeface="Arial"/>
                 </a:rPr>
-                <a:t>51.4%</a:t>
+                <a:t>46.2%</a:t>
               </a:r>
             </a:p>
           </p:txBody>
@@ -8908,6 +8908,52 @@
           <p:spPr>
             <a:xfrm>
               <a:off x="7504022" y="3632432"/>
+              <a:ext cx="419100" cy="69850"/>
+            </a:xfrm>
+            <a:prstGeom prst="rect">
+              <a:avLst/>
+            </a:prstGeom>
+            <a:noFill/>
+          </p:spPr>
+          <p:txBody>
+            <a:bodyPr lIns="0" rIns="0" tIns="0" bIns="0" anchorCtr="1" anchor="ctr" wrap="none"/>
+            <a:lstStyle/>
+            <a:p>
+              <a:pPr algn="l" marL="0" marR="0" indent="0">
+                <a:lnSpc>
+                  <a:spcPts val="880"/>
+                </a:lnSpc>
+                <a:spcBef>
+                  <a:spcPts val="0"/>
+                </a:spcBef>
+                <a:spcAft>
+                  <a:spcPts val="0"/>
+                </a:spcAft>
+              </a:pPr>
+              <a:r>
+                <a:rPr sz="880">
+                  <a:solidFill>
+                    <a:srgbClr val="000000">
+                      <a:alpha val="100000"/>
+                    </a:srgbClr>
+                  </a:solidFill>
+                  <a:latin typeface="Arial"/>
+                  <a:cs typeface="Arial"/>
+                </a:rPr>
+                <a:t>企业管理者</a:t>
+              </a:r>
+            </a:p>
+          </p:txBody>
+        </p:sp>
+        <p:sp>
+          <p:nvSpPr>
+            <p:cNvPr id="101" name="tx101"/>
+            <p:cNvSpPr/>
+            <p:nvPr/>
+          </p:nvSpPr>
+          <p:spPr>
+            <a:xfrm>
+              <a:off x="7504022" y="3851888"/>
               <a:ext cx="167640" cy="69850"/>
             </a:xfrm>
             <a:prstGeom prst="rect">
@@ -8941,52 +8987,6 @@
                   <a:cs typeface="Arial"/>
                 </a:rPr>
                 <a:t>其他</a:t>
-              </a:r>
-            </a:p>
-          </p:txBody>
-        </p:sp>
-        <p:sp>
-          <p:nvSpPr>
-            <p:cNvPr id="101" name="tx101"/>
-            <p:cNvSpPr/>
-            <p:nvPr/>
-          </p:nvSpPr>
-          <p:spPr>
-            <a:xfrm>
-              <a:off x="7504022" y="3851888"/>
-              <a:ext cx="419100" cy="69850"/>
-            </a:xfrm>
-            <a:prstGeom prst="rect">
-              <a:avLst/>
-            </a:prstGeom>
-            <a:noFill/>
-          </p:spPr>
-          <p:txBody>
-            <a:bodyPr lIns="0" rIns="0" tIns="0" bIns="0" anchorCtr="1" anchor="ctr" wrap="none"/>
-            <a:lstStyle/>
-            <a:p>
-              <a:pPr algn="l" marL="0" marR="0" indent="0">
-                <a:lnSpc>
-                  <a:spcPts val="880"/>
-                </a:lnSpc>
-                <a:spcBef>
-                  <a:spcPts val="0"/>
-                </a:spcBef>
-                <a:spcAft>
-                  <a:spcPts val="0"/>
-                </a:spcAft>
-              </a:pPr>
-              <a:r>
-                <a:rPr sz="880">
-                  <a:solidFill>
-                    <a:srgbClr val="000000">
-                      <a:alpha val="100000"/>
-                    </a:srgbClr>
-                  </a:solidFill>
-                  <a:latin typeface="Arial"/>
-                  <a:cs typeface="Arial"/>
-                </a:rPr>
-                <a:t>企业管理者</a:t>
               </a:r>
             </a:p>
           </p:txBody>

</xml_diff>